<commit_message>
fillin in the plotzzz
</commit_message>
<xml_diff>
--- a/thought_process.pptx
+++ b/thought_process.pptx
@@ -9,6 +9,8 @@
     <p:sldId id="257" r:id="rId3"/>
     <p:sldId id="258" r:id="rId4"/>
     <p:sldId id="259" r:id="rId5"/>
+    <p:sldId id="260" r:id="rId6"/>
+    <p:sldId id="261" r:id="rId7"/>
   </p:sldIdLst>
   <p:sldSz cx="9144000" cy="6858000" type="screen4x3"/>
   <p:notesSz cx="6858000" cy="9144000"/>
@@ -291,7 +293,7 @@
           <a:p>
             <a:fld id="{FE1D6D34-E53B-4A44-8CD7-23C2A4E6AD02}" type="datetimeFigureOut">
               <a:rPr lang="en-US" smtClean="0"/>
-              <a:t>9/28/2015</a:t>
+              <a:t>9/29/2015</a:t>
             </a:fld>
             <a:endParaRPr lang="en-US"/>
           </a:p>
@@ -461,7 +463,7 @@
           <a:p>
             <a:fld id="{FE1D6D34-E53B-4A44-8CD7-23C2A4E6AD02}" type="datetimeFigureOut">
               <a:rPr lang="en-US" smtClean="0"/>
-              <a:t>9/28/2015</a:t>
+              <a:t>9/29/2015</a:t>
             </a:fld>
             <a:endParaRPr lang="en-US"/>
           </a:p>
@@ -641,7 +643,7 @@
           <a:p>
             <a:fld id="{FE1D6D34-E53B-4A44-8CD7-23C2A4E6AD02}" type="datetimeFigureOut">
               <a:rPr lang="en-US" smtClean="0"/>
-              <a:t>9/28/2015</a:t>
+              <a:t>9/29/2015</a:t>
             </a:fld>
             <a:endParaRPr lang="en-US"/>
           </a:p>
@@ -811,7 +813,7 @@
           <a:p>
             <a:fld id="{FE1D6D34-E53B-4A44-8CD7-23C2A4E6AD02}" type="datetimeFigureOut">
               <a:rPr lang="en-US" smtClean="0"/>
-              <a:t>9/28/2015</a:t>
+              <a:t>9/29/2015</a:t>
             </a:fld>
             <a:endParaRPr lang="en-US"/>
           </a:p>
@@ -1057,7 +1059,7 @@
           <a:p>
             <a:fld id="{FE1D6D34-E53B-4A44-8CD7-23C2A4E6AD02}" type="datetimeFigureOut">
               <a:rPr lang="en-US" smtClean="0"/>
-              <a:t>9/28/2015</a:t>
+              <a:t>9/29/2015</a:t>
             </a:fld>
             <a:endParaRPr lang="en-US"/>
           </a:p>
@@ -1345,7 +1347,7 @@
           <a:p>
             <a:fld id="{FE1D6D34-E53B-4A44-8CD7-23C2A4E6AD02}" type="datetimeFigureOut">
               <a:rPr lang="en-US" smtClean="0"/>
-              <a:t>9/28/2015</a:t>
+              <a:t>9/29/2015</a:t>
             </a:fld>
             <a:endParaRPr lang="en-US"/>
           </a:p>
@@ -1767,7 +1769,7 @@
           <a:p>
             <a:fld id="{FE1D6D34-E53B-4A44-8CD7-23C2A4E6AD02}" type="datetimeFigureOut">
               <a:rPr lang="en-US" smtClean="0"/>
-              <a:t>9/28/2015</a:t>
+              <a:t>9/29/2015</a:t>
             </a:fld>
             <a:endParaRPr lang="en-US"/>
           </a:p>
@@ -1885,7 +1887,7 @@
           <a:p>
             <a:fld id="{FE1D6D34-E53B-4A44-8CD7-23C2A4E6AD02}" type="datetimeFigureOut">
               <a:rPr lang="en-US" smtClean="0"/>
-              <a:t>9/28/2015</a:t>
+              <a:t>9/29/2015</a:t>
             </a:fld>
             <a:endParaRPr lang="en-US"/>
           </a:p>
@@ -1980,7 +1982,7 @@
           <a:p>
             <a:fld id="{FE1D6D34-E53B-4A44-8CD7-23C2A4E6AD02}" type="datetimeFigureOut">
               <a:rPr lang="en-US" smtClean="0"/>
-              <a:t>9/28/2015</a:t>
+              <a:t>9/29/2015</a:t>
             </a:fld>
             <a:endParaRPr lang="en-US"/>
           </a:p>
@@ -2257,7 +2259,7 @@
           <a:p>
             <a:fld id="{FE1D6D34-E53B-4A44-8CD7-23C2A4E6AD02}" type="datetimeFigureOut">
               <a:rPr lang="en-US" smtClean="0"/>
-              <a:t>9/28/2015</a:t>
+              <a:t>9/29/2015</a:t>
             </a:fld>
             <a:endParaRPr lang="en-US"/>
           </a:p>
@@ -2510,7 +2512,7 @@
           <a:p>
             <a:fld id="{FE1D6D34-E53B-4A44-8CD7-23C2A4E6AD02}" type="datetimeFigureOut">
               <a:rPr lang="en-US" smtClean="0"/>
-              <a:t>9/28/2015</a:t>
+              <a:t>9/29/2015</a:t>
             </a:fld>
             <a:endParaRPr lang="en-US"/>
           </a:p>
@@ -2723,7 +2725,7 @@
           <a:p>
             <a:fld id="{FE1D6D34-E53B-4A44-8CD7-23C2A4E6AD02}" type="datetimeFigureOut">
               <a:rPr lang="en-US" smtClean="0"/>
-              <a:t>9/28/2015</a:t>
+              <a:t>9/29/2015</a:t>
             </a:fld>
             <a:endParaRPr lang="en-US"/>
           </a:p>
@@ -3119,7 +3121,26 @@
               <a:rPr lang="en-US" sz="3200" dirty="0" smtClean="0"/>
               <a:t>Things thought about and decided on choosing certain plots, etc.</a:t>
             </a:r>
-            <a:endParaRPr lang="en-US" sz="3200" dirty="0"/>
+            <a:br>
+              <a:rPr lang="en-US" sz="3200" dirty="0" smtClean="0"/>
+            </a:br>
+            <a:r>
+              <a:rPr lang="en-US" sz="2200" dirty="0" smtClean="0">
+                <a:solidFill>
+                  <a:schemeClr val="bg1">
+                    <a:lumMod val="50000"/>
+                  </a:schemeClr>
+                </a:solidFill>
+              </a:rPr>
+              <a:t>also just production processes</a:t>
+            </a:r>
+            <a:endParaRPr lang="en-US" sz="3200" dirty="0">
+              <a:solidFill>
+                <a:schemeClr val="bg1">
+                  <a:lumMod val="50000"/>
+                </a:schemeClr>
+              </a:solidFill>
+            </a:endParaRPr>
           </a:p>
         </p:txBody>
       </p:sp>
@@ -3904,6 +3925,186 @@
     <p:extLst>
       <p:ext uri="{BB962C8B-B14F-4D97-AF65-F5344CB8AC3E}">
         <p14:creationId xmlns:p14="http://schemas.microsoft.com/office/powerpoint/2010/main" val="2702411045"/>
+      </p:ext>
+    </p:extLst>
+  </p:cSld>
+  <p:clrMapOvr>
+    <a:masterClrMapping/>
+  </p:clrMapOvr>
+</p:sld>
+</file>
+
+<file path=ppt/slides/slide5.xml><?xml version="1.0" encoding="utf-8"?>
+<p:sld xmlns:a="http://schemas.openxmlformats.org/drawingml/2006/main" xmlns:r="http://schemas.openxmlformats.org/officeDocument/2006/relationships" xmlns:p="http://schemas.openxmlformats.org/presentationml/2006/main">
+  <p:cSld>
+    <p:spTree>
+      <p:nvGrpSpPr>
+        <p:cNvPr id="1" name=""/>
+        <p:cNvGrpSpPr/>
+        <p:nvPr/>
+      </p:nvGrpSpPr>
+      <p:grpSpPr>
+        <a:xfrm>
+          <a:off x="0" y="0"/>
+          <a:ext cx="0" cy="0"/>
+          <a:chOff x="0" y="0"/>
+          <a:chExt cx="0" cy="0"/>
+        </a:xfrm>
+      </p:grpSpPr>
+      <p:pic>
+        <p:nvPicPr>
+          <p:cNvPr id="2" name="Picture 1"/>
+          <p:cNvPicPr>
+            <a:picLocks noChangeAspect="1"/>
+          </p:cNvPicPr>
+          <p:nvPr/>
+        </p:nvPicPr>
+        <p:blipFill>
+          <a:blip r:embed="rId2">
+            <a:extLst>
+              <a:ext uri="{28A0092B-C50C-407E-A947-70E740481C1C}">
+                <a14:useLocalDpi xmlns:a14="http://schemas.microsoft.com/office/drawing/2010/main" val="0"/>
+              </a:ext>
+            </a:extLst>
+          </a:blip>
+          <a:stretch>
+            <a:fillRect/>
+          </a:stretch>
+        </p:blipFill>
+        <p:spPr>
+          <a:xfrm>
+            <a:off x="1447800" y="1447800"/>
+            <a:ext cx="6257925" cy="4445376"/>
+          </a:xfrm>
+          <a:prstGeom prst="rect">
+            <a:avLst/>
+          </a:prstGeom>
+        </p:spPr>
+      </p:pic>
+      <p:sp>
+        <p:nvSpPr>
+          <p:cNvPr id="3" name="TextBox 2"/>
+          <p:cNvSpPr txBox="1"/>
+          <p:nvPr/>
+        </p:nvSpPr>
+        <p:spPr>
+          <a:xfrm>
+            <a:off x="457200" y="381000"/>
+            <a:ext cx="3521285" cy="369332"/>
+          </a:xfrm>
+          <a:prstGeom prst="rect">
+            <a:avLst/>
+          </a:prstGeom>
+          <a:noFill/>
+        </p:spPr>
+        <p:txBody>
+          <a:bodyPr wrap="none" rtlCol="0">
+            <a:spAutoFit/>
+          </a:bodyPr>
+          <a:lstStyle/>
+          <a:p>
+            <a:r>
+              <a:rPr lang="en-US" dirty="0" smtClean="0"/>
+              <a:t>Achieving the surface BG spectrum:</a:t>
+            </a:r>
+            <a:endParaRPr lang="en-US" dirty="0"/>
+          </a:p>
+        </p:txBody>
+      </p:sp>
+    </p:spTree>
+    <p:extLst>
+      <p:ext uri="{BB962C8B-B14F-4D97-AF65-F5344CB8AC3E}">
+        <p14:creationId xmlns:p14="http://schemas.microsoft.com/office/powerpoint/2010/main" val="2912598340"/>
+      </p:ext>
+    </p:extLst>
+  </p:cSld>
+  <p:clrMapOvr>
+    <a:masterClrMapping/>
+  </p:clrMapOvr>
+</p:sld>
+</file>
+
+<file path=ppt/slides/slide6.xml><?xml version="1.0" encoding="utf-8"?>
+<p:sld xmlns:a="http://schemas.openxmlformats.org/drawingml/2006/main" xmlns:r="http://schemas.openxmlformats.org/officeDocument/2006/relationships" xmlns:p="http://schemas.openxmlformats.org/presentationml/2006/main">
+  <p:cSld>
+    <p:spTree>
+      <p:nvGrpSpPr>
+        <p:cNvPr id="1" name=""/>
+        <p:cNvGrpSpPr/>
+        <p:nvPr/>
+      </p:nvGrpSpPr>
+      <p:grpSpPr>
+        <a:xfrm>
+          <a:off x="0" y="0"/>
+          <a:ext cx="0" cy="0"/>
+          <a:chOff x="0" y="0"/>
+          <a:chExt cx="0" cy="0"/>
+        </a:xfrm>
+      </p:grpSpPr>
+      <p:pic>
+        <p:nvPicPr>
+          <p:cNvPr id="2" name="Picture 1"/>
+          <p:cNvPicPr>
+            <a:picLocks noChangeAspect="1"/>
+          </p:cNvPicPr>
+          <p:nvPr/>
+        </p:nvPicPr>
+        <p:blipFill>
+          <a:blip r:embed="rId2">
+            <a:extLst>
+              <a:ext uri="{28A0092B-C50C-407E-A947-70E740481C1C}">
+                <a14:useLocalDpi xmlns:a14="http://schemas.microsoft.com/office/drawing/2010/main" val="0"/>
+              </a:ext>
+            </a:extLst>
+          </a:blip>
+          <a:stretch>
+            <a:fillRect/>
+          </a:stretch>
+        </p:blipFill>
+        <p:spPr>
+          <a:xfrm>
+            <a:off x="1066800" y="1600200"/>
+            <a:ext cx="7162800" cy="4024583"/>
+          </a:xfrm>
+          <a:prstGeom prst="rect">
+            <a:avLst/>
+          </a:prstGeom>
+        </p:spPr>
+      </p:pic>
+      <p:sp>
+        <p:nvSpPr>
+          <p:cNvPr id="3" name="TextBox 2"/>
+          <p:cNvSpPr txBox="1"/>
+          <p:nvPr/>
+        </p:nvSpPr>
+        <p:spPr>
+          <a:xfrm>
+            <a:off x="1342768" y="316468"/>
+            <a:ext cx="6261714" cy="369332"/>
+          </a:xfrm>
+          <a:prstGeom prst="rect">
+            <a:avLst/>
+          </a:prstGeom>
+          <a:noFill/>
+        </p:spPr>
+        <p:txBody>
+          <a:bodyPr wrap="none" rtlCol="0">
+            <a:spAutoFit/>
+          </a:bodyPr>
+          <a:lstStyle/>
+          <a:p>
+            <a:r>
+              <a:rPr lang="en-US" dirty="0" smtClean="0"/>
+              <a:t>I cannot find the code for re-binning plots, so I for-went this one:</a:t>
+            </a:r>
+            <a:endParaRPr lang="en-US" dirty="0"/>
+          </a:p>
+        </p:txBody>
+      </p:sp>
+    </p:spTree>
+    <p:extLst>
+      <p:ext uri="{BB962C8B-B14F-4D97-AF65-F5344CB8AC3E}">
+        <p14:creationId xmlns:p14="http://schemas.microsoft.com/office/powerpoint/2010/main" val="1216166304"/>
       </p:ext>
     </p:extLst>
   </p:cSld>

</xml_diff>

<commit_message>
worked through astig corr plots, still need to put them in
</commit_message>
<xml_diff>
--- a/thought_process.pptx
+++ b/thought_process.pptx
@@ -295,7 +295,7 @@
           <a:p>
             <a:fld id="{FE1D6D34-E53B-4A44-8CD7-23C2A4E6AD02}" type="datetimeFigureOut">
               <a:rPr lang="en-US" smtClean="0"/>
-              <a:t>10/12/2015</a:t>
+              <a:t>10/13/2015</a:t>
             </a:fld>
             <a:endParaRPr lang="en-US"/>
           </a:p>
@@ -465,7 +465,7 @@
           <a:p>
             <a:fld id="{FE1D6D34-E53B-4A44-8CD7-23C2A4E6AD02}" type="datetimeFigureOut">
               <a:rPr lang="en-US" smtClean="0"/>
-              <a:t>10/12/2015</a:t>
+              <a:t>10/13/2015</a:t>
             </a:fld>
             <a:endParaRPr lang="en-US"/>
           </a:p>
@@ -645,7 +645,7 @@
           <a:p>
             <a:fld id="{FE1D6D34-E53B-4A44-8CD7-23C2A4E6AD02}" type="datetimeFigureOut">
               <a:rPr lang="en-US" smtClean="0"/>
-              <a:t>10/12/2015</a:t>
+              <a:t>10/13/2015</a:t>
             </a:fld>
             <a:endParaRPr lang="en-US"/>
           </a:p>
@@ -815,7 +815,7 @@
           <a:p>
             <a:fld id="{FE1D6D34-E53B-4A44-8CD7-23C2A4E6AD02}" type="datetimeFigureOut">
               <a:rPr lang="en-US" smtClean="0"/>
-              <a:t>10/12/2015</a:t>
+              <a:t>10/13/2015</a:t>
             </a:fld>
             <a:endParaRPr lang="en-US"/>
           </a:p>
@@ -1061,7 +1061,7 @@
           <a:p>
             <a:fld id="{FE1D6D34-E53B-4A44-8CD7-23C2A4E6AD02}" type="datetimeFigureOut">
               <a:rPr lang="en-US" smtClean="0"/>
-              <a:t>10/12/2015</a:t>
+              <a:t>10/13/2015</a:t>
             </a:fld>
             <a:endParaRPr lang="en-US"/>
           </a:p>
@@ -1349,7 +1349,7 @@
           <a:p>
             <a:fld id="{FE1D6D34-E53B-4A44-8CD7-23C2A4E6AD02}" type="datetimeFigureOut">
               <a:rPr lang="en-US" smtClean="0"/>
-              <a:t>10/12/2015</a:t>
+              <a:t>10/13/2015</a:t>
             </a:fld>
             <a:endParaRPr lang="en-US"/>
           </a:p>
@@ -1771,7 +1771,7 @@
           <a:p>
             <a:fld id="{FE1D6D34-E53B-4A44-8CD7-23C2A4E6AD02}" type="datetimeFigureOut">
               <a:rPr lang="en-US" smtClean="0"/>
-              <a:t>10/12/2015</a:t>
+              <a:t>10/13/2015</a:t>
             </a:fld>
             <a:endParaRPr lang="en-US"/>
           </a:p>
@@ -1889,7 +1889,7 @@
           <a:p>
             <a:fld id="{FE1D6D34-E53B-4A44-8CD7-23C2A4E6AD02}" type="datetimeFigureOut">
               <a:rPr lang="en-US" smtClean="0"/>
-              <a:t>10/12/2015</a:t>
+              <a:t>10/13/2015</a:t>
             </a:fld>
             <a:endParaRPr lang="en-US"/>
           </a:p>
@@ -1984,7 +1984,7 @@
           <a:p>
             <a:fld id="{FE1D6D34-E53B-4A44-8CD7-23C2A4E6AD02}" type="datetimeFigureOut">
               <a:rPr lang="en-US" smtClean="0"/>
-              <a:t>10/12/2015</a:t>
+              <a:t>10/13/2015</a:t>
             </a:fld>
             <a:endParaRPr lang="en-US"/>
           </a:p>
@@ -2261,7 +2261,7 @@
           <a:p>
             <a:fld id="{FE1D6D34-E53B-4A44-8CD7-23C2A4E6AD02}" type="datetimeFigureOut">
               <a:rPr lang="en-US" smtClean="0"/>
-              <a:t>10/12/2015</a:t>
+              <a:t>10/13/2015</a:t>
             </a:fld>
             <a:endParaRPr lang="en-US"/>
           </a:p>
@@ -2514,7 +2514,7 @@
           <a:p>
             <a:fld id="{FE1D6D34-E53B-4A44-8CD7-23C2A4E6AD02}" type="datetimeFigureOut">
               <a:rPr lang="en-US" smtClean="0"/>
-              <a:t>10/12/2015</a:t>
+              <a:t>10/13/2015</a:t>
             </a:fld>
             <a:endParaRPr lang="en-US"/>
           </a:p>
@@ -2727,7 +2727,7 @@
           <a:p>
             <a:fld id="{FE1D6D34-E53B-4A44-8CD7-23C2A4E6AD02}" type="datetimeFigureOut">
               <a:rPr lang="en-US" smtClean="0"/>
-              <a:t>10/12/2015</a:t>
+              <a:t>10/13/2015</a:t>
             </a:fld>
             <a:endParaRPr lang="en-US"/>
           </a:p>
@@ -4280,7 +4280,7 @@
         <p:spPr>
           <a:xfrm>
             <a:off x="1066800" y="1219200"/>
-            <a:ext cx="5590248" cy="369332"/>
+            <a:ext cx="5898025" cy="369332"/>
           </a:xfrm>
           <a:prstGeom prst="rect">
             <a:avLst/>
@@ -4295,7 +4295,19 @@
           <a:p>
             <a:r>
               <a:rPr lang="en-US" dirty="0" smtClean="0"/>
-              <a:t>Determining the “typical variance” of laser peak in image:</a:t>
+              <a:t>Determining the “typical variance” of </a:t>
+            </a:r>
+            <a:r>
+              <a:rPr lang="en-US" smtClean="0"/>
+              <a:t>laser </a:t>
+            </a:r>
+            <a:r>
+              <a:rPr lang="en-US" smtClean="0"/>
+              <a:t>position </a:t>
+            </a:r>
+            <a:r>
+              <a:rPr lang="en-US" dirty="0" smtClean="0"/>
+              <a:t>in image:</a:t>
             </a:r>
             <a:endParaRPr lang="en-US" dirty="0"/>
           </a:p>

</xml_diff>

<commit_message>
sfsadfasdfasdfas i mean working on man whatever
</commit_message>
<xml_diff>
--- a/thought_process.pptx
+++ b/thought_process.pptx
@@ -14,6 +14,7 @@
     <p:sldId id="262" r:id="rId8"/>
     <p:sldId id="263" r:id="rId9"/>
     <p:sldId id="264" r:id="rId10"/>
+    <p:sldId id="265" r:id="rId11"/>
   </p:sldIdLst>
   <p:sldSz cx="9144000" cy="6858000" type="screen4x3"/>
   <p:notesSz cx="6858000" cy="9144000"/>
@@ -296,7 +297,7 @@
           <a:p>
             <a:fld id="{FE1D6D34-E53B-4A44-8CD7-23C2A4E6AD02}" type="datetimeFigureOut">
               <a:rPr lang="en-US" smtClean="0"/>
-              <a:t>10/14/2015</a:t>
+              <a:t>10/21/2015</a:t>
             </a:fld>
             <a:endParaRPr lang="en-US"/>
           </a:p>
@@ -466,7 +467,7 @@
           <a:p>
             <a:fld id="{FE1D6D34-E53B-4A44-8CD7-23C2A4E6AD02}" type="datetimeFigureOut">
               <a:rPr lang="en-US" smtClean="0"/>
-              <a:t>10/14/2015</a:t>
+              <a:t>10/21/2015</a:t>
             </a:fld>
             <a:endParaRPr lang="en-US"/>
           </a:p>
@@ -646,7 +647,7 @@
           <a:p>
             <a:fld id="{FE1D6D34-E53B-4A44-8CD7-23C2A4E6AD02}" type="datetimeFigureOut">
               <a:rPr lang="en-US" smtClean="0"/>
-              <a:t>10/14/2015</a:t>
+              <a:t>10/21/2015</a:t>
             </a:fld>
             <a:endParaRPr lang="en-US"/>
           </a:p>
@@ -816,7 +817,7 @@
           <a:p>
             <a:fld id="{FE1D6D34-E53B-4A44-8CD7-23C2A4E6AD02}" type="datetimeFigureOut">
               <a:rPr lang="en-US" smtClean="0"/>
-              <a:t>10/14/2015</a:t>
+              <a:t>10/21/2015</a:t>
             </a:fld>
             <a:endParaRPr lang="en-US"/>
           </a:p>
@@ -1062,7 +1063,7 @@
           <a:p>
             <a:fld id="{FE1D6D34-E53B-4A44-8CD7-23C2A4E6AD02}" type="datetimeFigureOut">
               <a:rPr lang="en-US" smtClean="0"/>
-              <a:t>10/14/2015</a:t>
+              <a:t>10/21/2015</a:t>
             </a:fld>
             <a:endParaRPr lang="en-US"/>
           </a:p>
@@ -1350,7 +1351,7 @@
           <a:p>
             <a:fld id="{FE1D6D34-E53B-4A44-8CD7-23C2A4E6AD02}" type="datetimeFigureOut">
               <a:rPr lang="en-US" smtClean="0"/>
-              <a:t>10/14/2015</a:t>
+              <a:t>10/21/2015</a:t>
             </a:fld>
             <a:endParaRPr lang="en-US"/>
           </a:p>
@@ -1772,7 +1773,7 @@
           <a:p>
             <a:fld id="{FE1D6D34-E53B-4A44-8CD7-23C2A4E6AD02}" type="datetimeFigureOut">
               <a:rPr lang="en-US" smtClean="0"/>
-              <a:t>10/14/2015</a:t>
+              <a:t>10/21/2015</a:t>
             </a:fld>
             <a:endParaRPr lang="en-US"/>
           </a:p>
@@ -1890,7 +1891,7 @@
           <a:p>
             <a:fld id="{FE1D6D34-E53B-4A44-8CD7-23C2A4E6AD02}" type="datetimeFigureOut">
               <a:rPr lang="en-US" smtClean="0"/>
-              <a:t>10/14/2015</a:t>
+              <a:t>10/21/2015</a:t>
             </a:fld>
             <a:endParaRPr lang="en-US"/>
           </a:p>
@@ -1985,7 +1986,7 @@
           <a:p>
             <a:fld id="{FE1D6D34-E53B-4A44-8CD7-23C2A4E6AD02}" type="datetimeFigureOut">
               <a:rPr lang="en-US" smtClean="0"/>
-              <a:t>10/14/2015</a:t>
+              <a:t>10/21/2015</a:t>
             </a:fld>
             <a:endParaRPr lang="en-US"/>
           </a:p>
@@ -2262,7 +2263,7 @@
           <a:p>
             <a:fld id="{FE1D6D34-E53B-4A44-8CD7-23C2A4E6AD02}" type="datetimeFigureOut">
               <a:rPr lang="en-US" smtClean="0"/>
-              <a:t>10/14/2015</a:t>
+              <a:t>10/21/2015</a:t>
             </a:fld>
             <a:endParaRPr lang="en-US"/>
           </a:p>
@@ -2515,7 +2516,7 @@
           <a:p>
             <a:fld id="{FE1D6D34-E53B-4A44-8CD7-23C2A4E6AD02}" type="datetimeFigureOut">
               <a:rPr lang="en-US" smtClean="0"/>
-              <a:t>10/14/2015</a:t>
+              <a:t>10/21/2015</a:t>
             </a:fld>
             <a:endParaRPr lang="en-US"/>
           </a:p>
@@ -2728,7 +2729,7 @@
           <a:p>
             <a:fld id="{FE1D6D34-E53B-4A44-8CD7-23C2A4E6AD02}" type="datetimeFigureOut">
               <a:rPr lang="en-US" smtClean="0"/>
-              <a:t>10/14/2015</a:t>
+              <a:t>10/21/2015</a:t>
             </a:fld>
             <a:endParaRPr lang="en-US"/>
           </a:p>
@@ -3151,6 +3152,386 @@
     <p:extLst>
       <p:ext uri="{BB962C8B-B14F-4D97-AF65-F5344CB8AC3E}">
         <p14:creationId xmlns:p14="http://schemas.microsoft.com/office/powerpoint/2010/main" val="4201800029"/>
+      </p:ext>
+    </p:extLst>
+  </p:cSld>
+  <p:clrMapOvr>
+    <a:masterClrMapping/>
+  </p:clrMapOvr>
+</p:sld>
+</file>
+
+<file path=ppt/slides/slide10.xml><?xml version="1.0" encoding="utf-8"?>
+<p:sld xmlns:a="http://schemas.openxmlformats.org/drawingml/2006/main" xmlns:r="http://schemas.openxmlformats.org/officeDocument/2006/relationships" xmlns:p="http://schemas.openxmlformats.org/presentationml/2006/main">
+  <p:cSld>
+    <p:spTree>
+      <p:nvGrpSpPr>
+        <p:cNvPr id="1" name=""/>
+        <p:cNvGrpSpPr/>
+        <p:nvPr/>
+      </p:nvGrpSpPr>
+      <p:grpSpPr>
+        <a:xfrm>
+          <a:off x="0" y="0"/>
+          <a:ext cx="0" cy="0"/>
+          <a:chOff x="0" y="0"/>
+          <a:chExt cx="0" cy="0"/>
+        </a:xfrm>
+      </p:grpSpPr>
+      <p:sp>
+        <p:nvSpPr>
+          <p:cNvPr id="2" name="TextBox 1"/>
+          <p:cNvSpPr txBox="1"/>
+          <p:nvPr/>
+        </p:nvSpPr>
+        <p:spPr>
+          <a:xfrm>
+            <a:off x="2743200" y="136849"/>
+            <a:ext cx="3522824" cy="369332"/>
+          </a:xfrm>
+          <a:prstGeom prst="rect">
+            <a:avLst/>
+          </a:prstGeom>
+          <a:noFill/>
+        </p:spPr>
+        <p:txBody>
+          <a:bodyPr wrap="none" rtlCol="0">
+            <a:spAutoFit/>
+          </a:bodyPr>
+          <a:lstStyle/>
+          <a:p>
+            <a:r>
+              <a:rPr lang="en-US" dirty="0" smtClean="0"/>
+              <a:t>Expected and Observed in Scanning</a:t>
+            </a:r>
+            <a:endParaRPr lang="en-US" dirty="0"/>
+          </a:p>
+        </p:txBody>
+      </p:sp>
+      <p:pic>
+        <p:nvPicPr>
+          <p:cNvPr id="3" name="Picture 2"/>
+          <p:cNvPicPr>
+            <a:picLocks noChangeAspect="1"/>
+          </p:cNvPicPr>
+          <p:nvPr/>
+        </p:nvPicPr>
+        <p:blipFill>
+          <a:blip r:embed="rId2" cstate="print">
+            <a:extLst>
+              <a:ext uri="{28A0092B-C50C-407E-A947-70E740481C1C}">
+                <a14:useLocalDpi xmlns:a14="http://schemas.microsoft.com/office/drawing/2010/main" val="0"/>
+              </a:ext>
+            </a:extLst>
+          </a:blip>
+          <a:stretch>
+            <a:fillRect/>
+          </a:stretch>
+        </p:blipFill>
+        <p:spPr>
+          <a:xfrm>
+            <a:off x="76200" y="1178824"/>
+            <a:ext cx="4119842" cy="3486020"/>
+          </a:xfrm>
+          <a:prstGeom prst="rect">
+            <a:avLst/>
+          </a:prstGeom>
+        </p:spPr>
+      </p:pic>
+      <p:sp>
+        <p:nvSpPr>
+          <p:cNvPr id="4" name="TextBox 3"/>
+          <p:cNvSpPr txBox="1"/>
+          <p:nvPr/>
+        </p:nvSpPr>
+        <p:spPr>
+          <a:xfrm>
+            <a:off x="0" y="609600"/>
+            <a:ext cx="4752840" cy="584775"/>
+          </a:xfrm>
+          <a:prstGeom prst="rect">
+            <a:avLst/>
+          </a:prstGeom>
+          <a:noFill/>
+        </p:spPr>
+        <p:txBody>
+          <a:bodyPr wrap="none" rtlCol="0">
+            <a:spAutoFit/>
+          </a:bodyPr>
+          <a:lstStyle/>
+          <a:p>
+            <a:r>
+              <a:rPr lang="en-US" sz="1600" dirty="0" smtClean="0"/>
+              <a:t>Expected signal from 20150807, / mW,</a:t>
+            </a:r>
+          </a:p>
+          <a:p>
+            <a:r>
+              <a:rPr lang="en-US" sz="1600" dirty="0" smtClean="0"/>
+              <a:t>with #atoms definition #2 (</a:t>
+            </a:r>
+            <a:r>
+              <a:rPr lang="en-US" sz="1600" b="1" dirty="0" smtClean="0"/>
+              <a:t>x2</a:t>
+            </a:r>
+            <a:r>
+              <a:rPr lang="en-US" sz="1600" dirty="0" smtClean="0"/>
+              <a:t> 2.06</a:t>
+            </a:r>
+            <a:r>
+              <a:rPr lang="az-Cyrl-AZ" sz="1600" dirty="0" smtClean="0"/>
+              <a:t>μ</a:t>
+            </a:r>
+            <a:r>
+              <a:rPr lang="en-US" sz="1600" dirty="0" smtClean="0"/>
+              <a:t>m×2.06</a:t>
+            </a:r>
+            <a:r>
+              <a:rPr lang="az-Cyrl-AZ" sz="1600" dirty="0"/>
+              <a:t>μ</a:t>
+            </a:r>
+            <a:r>
+              <a:rPr lang="en-US" sz="1600" dirty="0" smtClean="0"/>
+              <a:t>m region):</a:t>
+            </a:r>
+            <a:endParaRPr lang="en-US" sz="1600" dirty="0"/>
+          </a:p>
+        </p:txBody>
+      </p:sp>
+      <p:sp>
+        <p:nvSpPr>
+          <p:cNvPr id="5" name="Right Arrow 4"/>
+          <p:cNvSpPr/>
+          <p:nvPr/>
+        </p:nvSpPr>
+        <p:spPr>
+          <a:xfrm>
+            <a:off x="2514600" y="3352800"/>
+            <a:ext cx="180840" cy="152400"/>
+          </a:xfrm>
+          <a:prstGeom prst="rightArrow">
+            <a:avLst/>
+          </a:prstGeom>
+        </p:spPr>
+        <p:style>
+          <a:lnRef idx="2">
+            <a:schemeClr val="accent1">
+              <a:shade val="50000"/>
+            </a:schemeClr>
+          </a:lnRef>
+          <a:fillRef idx="1">
+            <a:schemeClr val="accent1"/>
+          </a:fillRef>
+          <a:effectRef idx="0">
+            <a:schemeClr val="accent1"/>
+          </a:effectRef>
+          <a:fontRef idx="minor">
+            <a:schemeClr val="lt1"/>
+          </a:fontRef>
+        </p:style>
+        <p:txBody>
+          <a:bodyPr rtlCol="0" anchor="ctr"/>
+          <a:lstStyle/>
+          <a:p>
+            <a:pPr algn="ctr"/>
+            <a:endParaRPr lang="en-US"/>
+          </a:p>
+        </p:txBody>
+      </p:sp>
+      <mc:AlternateContent xmlns:mc="http://schemas.openxmlformats.org/markup-compatibility/2006">
+        <mc:Choice xmlns:a14="http://schemas.microsoft.com/office/drawing/2010/main" Requires="a14">
+          <p:sp>
+            <p:nvSpPr>
+              <p:cNvPr id="6" name="TextBox 5"/>
+              <p:cNvSpPr txBox="1"/>
+              <p:nvPr/>
+            </p:nvSpPr>
+            <p:spPr>
+              <a:xfrm>
+                <a:off x="2744755" y="3042323"/>
+                <a:ext cx="1640001" cy="773353"/>
+              </a:xfrm>
+              <a:prstGeom prst="rect">
+                <a:avLst/>
+              </a:prstGeom>
+              <a:solidFill>
+                <a:schemeClr val="accent4">
+                  <a:lumMod val="40000"/>
+                  <a:lumOff val="60000"/>
+                </a:schemeClr>
+              </a:solidFill>
+            </p:spPr>
+            <p:txBody>
+              <a:bodyPr wrap="none" rtlCol="0">
+                <a:spAutoFit/>
+              </a:bodyPr>
+              <a:lstStyle/>
+              <a:p>
+                <a:r>
+                  <a:rPr lang="en-US" dirty="0" smtClean="0"/>
+                  <a:t>1000 </a:t>
+                </a:r>
+                <a14:m>
+                  <m:oMath xmlns:m="http://schemas.openxmlformats.org/officeDocument/2006/math">
+                    <m:f>
+                      <m:fPr>
+                        <m:ctrlPr>
+                          <a:rPr lang="en-US" i="1" smtClean="0">
+                            <a:latin typeface="Cambria Math"/>
+                          </a:rPr>
+                        </m:ctrlPr>
+                      </m:fPr>
+                      <m:num>
+                        <m:r>
+                          <m:rPr>
+                            <m:sty m:val="p"/>
+                          </m:rPr>
+                          <a:rPr lang="en-US" b="0" i="0" smtClean="0">
+                            <a:latin typeface="Cambria Math"/>
+                          </a:rPr>
+                          <m:t>cts</m:t>
+                        </m:r>
+                        <m:r>
+                          <a:rPr lang="en-US" b="0" i="0" smtClean="0">
+                            <a:latin typeface="Cambria Math"/>
+                          </a:rPr>
+                          <m:t>/</m:t>
+                        </m:r>
+                        <m:r>
+                          <m:rPr>
+                            <m:sty m:val="p"/>
+                          </m:rPr>
+                          <a:rPr lang="en-US" b="0" i="0" smtClean="0">
+                            <a:latin typeface="Cambria Math"/>
+                          </a:rPr>
+                          <m:t>atom</m:t>
+                        </m:r>
+                      </m:num>
+                      <m:den>
+                        <m:r>
+                          <m:rPr>
+                            <m:sty m:val="p"/>
+                          </m:rPr>
+                          <a:rPr lang="en-US" b="0" i="0" smtClean="0">
+                            <a:latin typeface="Cambria Math"/>
+                          </a:rPr>
+                          <m:t>mW</m:t>
+                        </m:r>
+                      </m:den>
+                    </m:f>
+                  </m:oMath>
+                </a14:m>
+                <a:endParaRPr lang="en-US" dirty="0" smtClean="0"/>
+              </a:p>
+              <a:p>
+                <a:r>
+                  <a:rPr lang="en-US" i="1" dirty="0"/>
+                  <a:t>o</a:t>
+                </a:r>
+                <a:r>
+                  <a:rPr lang="en-US" i="1" dirty="0" smtClean="0"/>
+                  <a:t>r</a:t>
+                </a:r>
+                <a:r>
+                  <a:rPr lang="en-US" dirty="0" smtClean="0"/>
+                  <a:t> 200 </a:t>
+                </a:r>
+                <a:r>
+                  <a:rPr lang="en-US" sz="1600" dirty="0" smtClean="0">
+                    <a:latin typeface="Cambria Math" panose="02040503050406030204" pitchFamily="18" charset="0"/>
+                    <a:ea typeface="Cambria Math" panose="02040503050406030204" pitchFamily="18" charset="0"/>
+                  </a:rPr>
+                  <a:t>cts/atom</a:t>
+                </a:r>
+                <a:endParaRPr lang="en-US" dirty="0">
+                  <a:latin typeface="Cambria Math" panose="02040503050406030204" pitchFamily="18" charset="0"/>
+                  <a:ea typeface="Cambria Math" panose="02040503050406030204" pitchFamily="18" charset="0"/>
+                </a:endParaRPr>
+              </a:p>
+            </p:txBody>
+          </p:sp>
+        </mc:Choice>
+        <mc:Fallback>
+          <p:sp>
+            <p:nvSpPr>
+              <p:cNvPr id="6" name="TextBox 5"/>
+              <p:cNvSpPr txBox="1">
+                <a:spLocks noRot="1" noChangeAspect="1" noMove="1" noResize="1" noEditPoints="1" noAdjustHandles="1" noChangeArrowheads="1" noChangeShapeType="1" noTextEdit="1"/>
+              </p:cNvSpPr>
+              <p:nvPr/>
+            </p:nvSpPr>
+            <p:spPr>
+              <a:xfrm>
+                <a:off x="2744755" y="3042323"/>
+                <a:ext cx="1640001" cy="773353"/>
+              </a:xfrm>
+              <a:prstGeom prst="rect">
+                <a:avLst/>
+              </a:prstGeom>
+              <a:blipFill rotWithShape="1">
+                <a:blip r:embed="rId3"/>
+                <a:stretch>
+                  <a:fillRect l="-2974" r="-372" b="-11811"/>
+                </a:stretch>
+              </a:blipFill>
+            </p:spPr>
+            <p:txBody>
+              <a:bodyPr/>
+              <a:lstStyle/>
+              <a:p>
+                <a:r>
+                  <a:rPr lang="en-US">
+                    <a:noFill/>
+                  </a:rPr>
+                  <a:t> </a:t>
+                </a:r>
+              </a:p>
+            </p:txBody>
+          </p:sp>
+        </mc:Fallback>
+      </mc:AlternateContent>
+      <p:sp>
+        <p:nvSpPr>
+          <p:cNvPr id="7" name="TextBox 6"/>
+          <p:cNvSpPr txBox="1"/>
+          <p:nvPr/>
+        </p:nvSpPr>
+        <p:spPr>
+          <a:xfrm>
+            <a:off x="2605020" y="2819400"/>
+            <a:ext cx="848181" cy="276999"/>
+          </a:xfrm>
+          <a:prstGeom prst="rect">
+            <a:avLst/>
+          </a:prstGeom>
+          <a:noFill/>
+        </p:spPr>
+        <p:txBody>
+          <a:bodyPr wrap="none" rtlCol="0">
+            <a:spAutoFit/>
+          </a:bodyPr>
+          <a:lstStyle/>
+          <a:p>
+            <a:r>
+              <a:rPr lang="en-US" sz="1200" b="1" dirty="0" smtClean="0">
+                <a:solidFill>
+                  <a:srgbClr val="7030A0"/>
+                </a:solidFill>
+              </a:rPr>
+              <a:t>trend line:</a:t>
+            </a:r>
+            <a:endParaRPr lang="en-US" sz="1200" b="1" dirty="0">
+              <a:solidFill>
+                <a:srgbClr val="7030A0"/>
+              </a:solidFill>
+            </a:endParaRPr>
+          </a:p>
+        </p:txBody>
+      </p:sp>
+    </p:spTree>
+    <p:extLst>
+      <p:ext uri="{BB962C8B-B14F-4D97-AF65-F5344CB8AC3E}">
+        <p14:creationId xmlns:p14="http://schemas.microsoft.com/office/powerpoint/2010/main" val="3650297208"/>
       </p:ext>
     </p:extLst>
   </p:cSld>

</xml_diff>

<commit_message>
working on new Method chapter
</commit_message>
<xml_diff>
--- a/thought_process.pptx
+++ b/thought_process.pptx
@@ -297,7 +297,7 @@
           <a:p>
             <a:fld id="{FE1D6D34-E53B-4A44-8CD7-23C2A4E6AD02}" type="datetimeFigureOut">
               <a:rPr lang="en-US" smtClean="0"/>
-              <a:t>10/21/2015</a:t>
+              <a:t>10/22/2015</a:t>
             </a:fld>
             <a:endParaRPr lang="en-US"/>
           </a:p>
@@ -467,7 +467,7 @@
           <a:p>
             <a:fld id="{FE1D6D34-E53B-4A44-8CD7-23C2A4E6AD02}" type="datetimeFigureOut">
               <a:rPr lang="en-US" smtClean="0"/>
-              <a:t>10/21/2015</a:t>
+              <a:t>10/22/2015</a:t>
             </a:fld>
             <a:endParaRPr lang="en-US"/>
           </a:p>
@@ -647,7 +647,7 @@
           <a:p>
             <a:fld id="{FE1D6D34-E53B-4A44-8CD7-23C2A4E6AD02}" type="datetimeFigureOut">
               <a:rPr lang="en-US" smtClean="0"/>
-              <a:t>10/21/2015</a:t>
+              <a:t>10/22/2015</a:t>
             </a:fld>
             <a:endParaRPr lang="en-US"/>
           </a:p>
@@ -817,7 +817,7 @@
           <a:p>
             <a:fld id="{FE1D6D34-E53B-4A44-8CD7-23C2A4E6AD02}" type="datetimeFigureOut">
               <a:rPr lang="en-US" smtClean="0"/>
-              <a:t>10/21/2015</a:t>
+              <a:t>10/22/2015</a:t>
             </a:fld>
             <a:endParaRPr lang="en-US"/>
           </a:p>
@@ -1063,7 +1063,7 @@
           <a:p>
             <a:fld id="{FE1D6D34-E53B-4A44-8CD7-23C2A4E6AD02}" type="datetimeFigureOut">
               <a:rPr lang="en-US" smtClean="0"/>
-              <a:t>10/21/2015</a:t>
+              <a:t>10/22/2015</a:t>
             </a:fld>
             <a:endParaRPr lang="en-US"/>
           </a:p>
@@ -1351,7 +1351,7 @@
           <a:p>
             <a:fld id="{FE1D6D34-E53B-4A44-8CD7-23C2A4E6AD02}" type="datetimeFigureOut">
               <a:rPr lang="en-US" smtClean="0"/>
-              <a:t>10/21/2015</a:t>
+              <a:t>10/22/2015</a:t>
             </a:fld>
             <a:endParaRPr lang="en-US"/>
           </a:p>
@@ -1773,7 +1773,7 @@
           <a:p>
             <a:fld id="{FE1D6D34-E53B-4A44-8CD7-23C2A4E6AD02}" type="datetimeFigureOut">
               <a:rPr lang="en-US" smtClean="0"/>
-              <a:t>10/21/2015</a:t>
+              <a:t>10/22/2015</a:t>
             </a:fld>
             <a:endParaRPr lang="en-US"/>
           </a:p>
@@ -1891,7 +1891,7 @@
           <a:p>
             <a:fld id="{FE1D6D34-E53B-4A44-8CD7-23C2A4E6AD02}" type="datetimeFigureOut">
               <a:rPr lang="en-US" smtClean="0"/>
-              <a:t>10/21/2015</a:t>
+              <a:t>10/22/2015</a:t>
             </a:fld>
             <a:endParaRPr lang="en-US"/>
           </a:p>
@@ -1986,7 +1986,7 @@
           <a:p>
             <a:fld id="{FE1D6D34-E53B-4A44-8CD7-23C2A4E6AD02}" type="datetimeFigureOut">
               <a:rPr lang="en-US" smtClean="0"/>
-              <a:t>10/21/2015</a:t>
+              <a:t>10/22/2015</a:t>
             </a:fld>
             <a:endParaRPr lang="en-US"/>
           </a:p>
@@ -2263,7 +2263,7 @@
           <a:p>
             <a:fld id="{FE1D6D34-E53B-4A44-8CD7-23C2A4E6AD02}" type="datetimeFigureOut">
               <a:rPr lang="en-US" smtClean="0"/>
-              <a:t>10/21/2015</a:t>
+              <a:t>10/22/2015</a:t>
             </a:fld>
             <a:endParaRPr lang="en-US"/>
           </a:p>
@@ -2516,7 +2516,7 @@
           <a:p>
             <a:fld id="{FE1D6D34-E53B-4A44-8CD7-23C2A4E6AD02}" type="datetimeFigureOut">
               <a:rPr lang="en-US" smtClean="0"/>
-              <a:t>10/21/2015</a:t>
+              <a:t>10/22/2015</a:t>
             </a:fld>
             <a:endParaRPr lang="en-US"/>
           </a:p>
@@ -2729,7 +2729,7 @@
           <a:p>
             <a:fld id="{FE1D6D34-E53B-4A44-8CD7-23C2A4E6AD02}" type="datetimeFigureOut">
               <a:rPr lang="en-US" smtClean="0"/>
-              <a:t>10/21/2015</a:t>
+              <a:t>10/22/2015</a:t>
             </a:fld>
             <a:endParaRPr lang="en-US"/>
           </a:p>
@@ -3338,8 +3338,8 @@
           </a:p>
         </p:txBody>
       </p:sp>
-      <mc:AlternateContent xmlns:mc="http://schemas.openxmlformats.org/markup-compatibility/2006">
-        <mc:Choice xmlns:a14="http://schemas.microsoft.com/office/drawing/2010/main" Requires="a14">
+      <mc:AlternateContent xmlns:mc="http://schemas.openxmlformats.org/markup-compatibility/2006" xmlns:a14="http://schemas.microsoft.com/office/drawing/2010/main">
+        <mc:Choice Requires="a14">
           <p:sp>
             <p:nvSpPr>
               <p:cNvPr id="6" name="TextBox 5"/>
@@ -3451,7 +3451,7 @@
             </p:txBody>
           </p:sp>
         </mc:Choice>
-        <mc:Fallback>
+        <mc:Fallback xmlns="">
           <p:sp>
             <p:nvSpPr>
               <p:cNvPr id="6" name="TextBox 5"/>
@@ -3523,6 +3523,326 @@
             <a:endParaRPr lang="en-US" sz="1200" b="1" dirty="0">
               <a:solidFill>
                 <a:srgbClr val="7030A0"/>
+              </a:solidFill>
+            </a:endParaRPr>
+          </a:p>
+        </p:txBody>
+      </p:sp>
+      <p:pic>
+        <p:nvPicPr>
+          <p:cNvPr id="8" name="Picture 7"/>
+          <p:cNvPicPr>
+            <a:picLocks noChangeAspect="1"/>
+          </p:cNvPicPr>
+          <p:nvPr/>
+        </p:nvPicPr>
+        <p:blipFill>
+          <a:blip r:embed="rId4" cstate="print">
+            <a:extLst>
+              <a:ext uri="{28A0092B-C50C-407E-A947-70E740481C1C}">
+                <a14:useLocalDpi xmlns:a14="http://schemas.microsoft.com/office/drawing/2010/main" val="0"/>
+              </a:ext>
+            </a:extLst>
+          </a:blip>
+          <a:stretch>
+            <a:fillRect/>
+          </a:stretch>
+        </p:blipFill>
+        <p:spPr>
+          <a:xfrm>
+            <a:off x="4687640" y="1611802"/>
+            <a:ext cx="2136936" cy="1309493"/>
+          </a:xfrm>
+          <a:prstGeom prst="rect">
+            <a:avLst/>
+          </a:prstGeom>
+        </p:spPr>
+      </p:pic>
+      <p:pic>
+        <p:nvPicPr>
+          <p:cNvPr id="9" name="Picture 8"/>
+          <p:cNvPicPr>
+            <a:picLocks noChangeAspect="1"/>
+          </p:cNvPicPr>
+          <p:nvPr/>
+        </p:nvPicPr>
+        <p:blipFill>
+          <a:blip r:embed="rId5" cstate="print">
+            <a:extLst>
+              <a:ext uri="{28A0092B-C50C-407E-A947-70E740481C1C}">
+                <a14:useLocalDpi xmlns:a14="http://schemas.microsoft.com/office/drawing/2010/main" val="0"/>
+              </a:ext>
+            </a:extLst>
+          </a:blip>
+          <a:stretch>
+            <a:fillRect/>
+          </a:stretch>
+        </p:blipFill>
+        <p:spPr>
+          <a:xfrm>
+            <a:off x="6880654" y="1611801"/>
+            <a:ext cx="2136936" cy="1309493"/>
+          </a:xfrm>
+          <a:prstGeom prst="rect">
+            <a:avLst/>
+          </a:prstGeom>
+        </p:spPr>
+      </p:pic>
+      <p:pic>
+        <p:nvPicPr>
+          <p:cNvPr id="10" name="Picture 9"/>
+          <p:cNvPicPr>
+            <a:picLocks noChangeAspect="1"/>
+          </p:cNvPicPr>
+          <p:nvPr/>
+        </p:nvPicPr>
+        <p:blipFill>
+          <a:blip r:embed="rId6" cstate="print">
+            <a:extLst>
+              <a:ext uri="{28A0092B-C50C-407E-A947-70E740481C1C}">
+                <a14:useLocalDpi xmlns:a14="http://schemas.microsoft.com/office/drawing/2010/main" val="0"/>
+              </a:ext>
+            </a:extLst>
+          </a:blip>
+          <a:stretch>
+            <a:fillRect/>
+          </a:stretch>
+        </p:blipFill>
+        <p:spPr>
+          <a:xfrm>
+            <a:off x="4654216" y="3070092"/>
+            <a:ext cx="2203784" cy="1349508"/>
+          </a:xfrm>
+          <a:prstGeom prst="rect">
+            <a:avLst/>
+          </a:prstGeom>
+        </p:spPr>
+      </p:pic>
+      <p:pic>
+        <p:nvPicPr>
+          <p:cNvPr id="11" name="Picture 10"/>
+          <p:cNvPicPr>
+            <a:picLocks noChangeAspect="1"/>
+          </p:cNvPicPr>
+          <p:nvPr/>
+        </p:nvPicPr>
+        <p:blipFill>
+          <a:blip r:embed="rId7" cstate="print">
+            <a:extLst>
+              <a:ext uri="{28A0092B-C50C-407E-A947-70E740481C1C}">
+                <a14:useLocalDpi xmlns:a14="http://schemas.microsoft.com/office/drawing/2010/main" val="0"/>
+              </a:ext>
+            </a:extLst>
+          </a:blip>
+          <a:stretch>
+            <a:fillRect/>
+          </a:stretch>
+        </p:blipFill>
+        <p:spPr>
+          <a:xfrm>
+            <a:off x="6847311" y="3070092"/>
+            <a:ext cx="2203784" cy="1349508"/>
+          </a:xfrm>
+          <a:prstGeom prst="rect">
+            <a:avLst/>
+          </a:prstGeom>
+        </p:spPr>
+      </p:pic>
+      <p:sp>
+        <p:nvSpPr>
+          <p:cNvPr id="12" name="TextBox 11"/>
+          <p:cNvSpPr txBox="1"/>
+          <p:nvPr/>
+        </p:nvSpPr>
+        <p:spPr>
+          <a:xfrm>
+            <a:off x="4724893" y="533400"/>
+            <a:ext cx="4199366" cy="1015663"/>
+          </a:xfrm>
+          <a:prstGeom prst="rect">
+            <a:avLst/>
+          </a:prstGeom>
+          <a:solidFill>
+            <a:schemeClr val="accent6">
+              <a:lumMod val="20000"/>
+              <a:lumOff val="80000"/>
+            </a:schemeClr>
+          </a:solidFill>
+        </p:spPr>
+        <p:txBody>
+          <a:bodyPr wrap="square" rtlCol="0">
+            <a:spAutoFit/>
+          </a:bodyPr>
+          <a:lstStyle/>
+          <a:p>
+            <a:r>
+              <a:rPr lang="en-US" sz="1200" b="1" dirty="0" smtClean="0">
+                <a:solidFill>
+                  <a:srgbClr val="C00000"/>
+                </a:solidFill>
+              </a:rPr>
+              <a:t>Next: </a:t>
+            </a:r>
+            <a:r>
+              <a:rPr lang="en-US" sz="1200" dirty="0" smtClean="0">
+                <a:solidFill>
+                  <a:srgbClr val="C00000"/>
+                </a:solidFill>
+              </a:rPr>
+              <a:t>consider these (in 1D/ of 8-12 and 8-21), and you had a script that plots them on the same plot, and you could observe things like (a) failure to match up for BG sub – what does that mean? (b) fluctuations are lower than they appeared in the 2D plots, …(c) is it lower in the bleached region of 8-21? …</a:t>
+            </a:r>
+            <a:endParaRPr lang="en-US" sz="1200" dirty="0">
+              <a:solidFill>
+                <a:srgbClr val="C00000"/>
+              </a:solidFill>
+            </a:endParaRPr>
+          </a:p>
+        </p:txBody>
+      </p:sp>
+      <p:pic>
+        <p:nvPicPr>
+          <p:cNvPr id="13" name="Picture 12"/>
+          <p:cNvPicPr>
+            <a:picLocks noChangeAspect="1"/>
+          </p:cNvPicPr>
+          <p:nvPr/>
+        </p:nvPicPr>
+        <p:blipFill rotWithShape="1">
+          <a:blip r:embed="rId8" cstate="print">
+            <a:extLst>
+              <a:ext uri="{28A0092B-C50C-407E-A947-70E740481C1C}">
+                <a14:useLocalDpi xmlns:a14="http://schemas.microsoft.com/office/drawing/2010/main" val="0"/>
+              </a:ext>
+            </a:extLst>
+          </a:blip>
+          <a:srcRect l="16422" t="6239" r="34220" b="7768"/>
+          <a:stretch/>
+        </p:blipFill>
+        <p:spPr>
+          <a:xfrm rot="5400000">
+            <a:off x="5732290" y="4173710"/>
+            <a:ext cx="2100417" cy="2744597"/>
+          </a:xfrm>
+          <a:prstGeom prst="rect">
+            <a:avLst/>
+          </a:prstGeom>
+        </p:spPr>
+      </p:pic>
+      <p:sp>
+        <p:nvSpPr>
+          <p:cNvPr id="14" name="TextBox 13"/>
+          <p:cNvSpPr txBox="1"/>
+          <p:nvPr/>
+        </p:nvSpPr>
+        <p:spPr>
+          <a:xfrm>
+            <a:off x="4504612" y="5176676"/>
+            <a:ext cx="678391" cy="369332"/>
+          </a:xfrm>
+          <a:prstGeom prst="rect">
+            <a:avLst/>
+          </a:prstGeom>
+          <a:noFill/>
+        </p:spPr>
+        <p:txBody>
+          <a:bodyPr wrap="none" rtlCol="0">
+            <a:spAutoFit/>
+          </a:bodyPr>
+          <a:lstStyle/>
+          <a:p>
+            <a:r>
+              <a:rPr lang="en-US" dirty="0" smtClean="0"/>
+              <a:t>Goal:</a:t>
+            </a:r>
+            <a:endParaRPr lang="en-US" dirty="0"/>
+          </a:p>
+        </p:txBody>
+      </p:sp>
+      <p:sp>
+        <p:nvSpPr>
+          <p:cNvPr id="15" name="TextBox 14"/>
+          <p:cNvSpPr txBox="1"/>
+          <p:nvPr/>
+        </p:nvSpPr>
+        <p:spPr>
+          <a:xfrm rot="485298">
+            <a:off x="7687357" y="6431400"/>
+            <a:ext cx="452368" cy="246221"/>
+          </a:xfrm>
+          <a:prstGeom prst="rect">
+            <a:avLst/>
+          </a:prstGeom>
+          <a:noFill/>
+        </p:spPr>
+        <p:txBody>
+          <a:bodyPr wrap="none" rtlCol="0">
+            <a:spAutoFit/>
+          </a:bodyPr>
+          <a:lstStyle/>
+          <a:p>
+            <a:r>
+              <a:rPr lang="en-US" sz="1000" dirty="0" err="1" smtClean="0">
+                <a:solidFill>
+                  <a:schemeClr val="tx1">
+                    <a:lumMod val="75000"/>
+                    <a:lumOff val="25000"/>
+                  </a:schemeClr>
+                </a:solidFill>
+              </a:rPr>
+              <a:t>ation</a:t>
+            </a:r>
+            <a:endParaRPr lang="en-US" sz="1000" dirty="0">
+              <a:solidFill>
+                <a:schemeClr val="tx1">
+                  <a:lumMod val="75000"/>
+                  <a:lumOff val="25000"/>
+                </a:schemeClr>
+              </a:solidFill>
+            </a:endParaRPr>
+          </a:p>
+        </p:txBody>
+      </p:sp>
+      <p:sp>
+        <p:nvSpPr>
+          <p:cNvPr id="16" name="TextBox 15"/>
+          <p:cNvSpPr txBox="1"/>
+          <p:nvPr/>
+        </p:nvSpPr>
+        <p:spPr>
+          <a:xfrm>
+            <a:off x="457200" y="5200471"/>
+            <a:ext cx="3927556" cy="1077218"/>
+          </a:xfrm>
+          <a:prstGeom prst="rect">
+            <a:avLst/>
+          </a:prstGeom>
+          <a:solidFill>
+            <a:schemeClr val="bg1">
+              <a:lumMod val="85000"/>
+            </a:schemeClr>
+          </a:solidFill>
+        </p:spPr>
+        <p:txBody>
+          <a:bodyPr wrap="square" rtlCol="0">
+            <a:spAutoFit/>
+          </a:bodyPr>
+          <a:lstStyle/>
+          <a:p>
+            <a:r>
+              <a:rPr lang="en-US" sz="1600" i="1" dirty="0">
+                <a:solidFill>
+                  <a:schemeClr val="accent6">
+                    <a:lumMod val="75000"/>
+                  </a:schemeClr>
+                </a:solidFill>
+              </a:rPr>
+              <a:t>Another question, since maybe the variations aren't as big as you thought, is are those peaks possibly actually atoms, in the ones that had a cool peak</a:t>
+            </a:r>
+            <a:endParaRPr lang="en-US" sz="1600" i="1" dirty="0">
+              <a:solidFill>
+                <a:schemeClr val="accent6">
+                  <a:lumMod val="75000"/>
+                </a:schemeClr>
               </a:solidFill>
             </a:endParaRPr>
           </a:p>

</xml_diff>

<commit_message>
bleaching data discussed, working on model stuff
</commit_message>
<xml_diff>
--- a/thought_process.pptx
+++ b/thought_process.pptx
@@ -16,7 +16,8 @@
     <p:sldId id="264" r:id="rId10"/>
     <p:sldId id="265" r:id="rId11"/>
     <p:sldId id="266" r:id="rId12"/>
-    <p:sldId id="267" r:id="rId13"/>
+    <p:sldId id="268" r:id="rId13"/>
+    <p:sldId id="267" r:id="rId14"/>
   </p:sldIdLst>
   <p:sldSz cx="9144000" cy="6858000" type="screen4x3"/>
   <p:notesSz cx="6858000" cy="9144000"/>
@@ -299,7 +300,7 @@
           <a:p>
             <a:fld id="{FE1D6D34-E53B-4A44-8CD7-23C2A4E6AD02}" type="datetimeFigureOut">
               <a:rPr lang="en-US" smtClean="0"/>
-              <a:t>10/27/2015</a:t>
+              <a:t>10/29/2015</a:t>
             </a:fld>
             <a:endParaRPr lang="en-US"/>
           </a:p>
@@ -469,7 +470,7 @@
           <a:p>
             <a:fld id="{FE1D6D34-E53B-4A44-8CD7-23C2A4E6AD02}" type="datetimeFigureOut">
               <a:rPr lang="en-US" smtClean="0"/>
-              <a:t>10/27/2015</a:t>
+              <a:t>10/29/2015</a:t>
             </a:fld>
             <a:endParaRPr lang="en-US"/>
           </a:p>
@@ -649,7 +650,7 @@
           <a:p>
             <a:fld id="{FE1D6D34-E53B-4A44-8CD7-23C2A4E6AD02}" type="datetimeFigureOut">
               <a:rPr lang="en-US" smtClean="0"/>
-              <a:t>10/27/2015</a:t>
+              <a:t>10/29/2015</a:t>
             </a:fld>
             <a:endParaRPr lang="en-US"/>
           </a:p>
@@ -819,7 +820,7 @@
           <a:p>
             <a:fld id="{FE1D6D34-E53B-4A44-8CD7-23C2A4E6AD02}" type="datetimeFigureOut">
               <a:rPr lang="en-US" smtClean="0"/>
-              <a:t>10/27/2015</a:t>
+              <a:t>10/29/2015</a:t>
             </a:fld>
             <a:endParaRPr lang="en-US"/>
           </a:p>
@@ -1065,7 +1066,7 @@
           <a:p>
             <a:fld id="{FE1D6D34-E53B-4A44-8CD7-23C2A4E6AD02}" type="datetimeFigureOut">
               <a:rPr lang="en-US" smtClean="0"/>
-              <a:t>10/27/2015</a:t>
+              <a:t>10/29/2015</a:t>
             </a:fld>
             <a:endParaRPr lang="en-US"/>
           </a:p>
@@ -1353,7 +1354,7 @@
           <a:p>
             <a:fld id="{FE1D6D34-E53B-4A44-8CD7-23C2A4E6AD02}" type="datetimeFigureOut">
               <a:rPr lang="en-US" smtClean="0"/>
-              <a:t>10/27/2015</a:t>
+              <a:t>10/29/2015</a:t>
             </a:fld>
             <a:endParaRPr lang="en-US"/>
           </a:p>
@@ -1775,7 +1776,7 @@
           <a:p>
             <a:fld id="{FE1D6D34-E53B-4A44-8CD7-23C2A4E6AD02}" type="datetimeFigureOut">
               <a:rPr lang="en-US" smtClean="0"/>
-              <a:t>10/27/2015</a:t>
+              <a:t>10/29/2015</a:t>
             </a:fld>
             <a:endParaRPr lang="en-US"/>
           </a:p>
@@ -1893,7 +1894,7 @@
           <a:p>
             <a:fld id="{FE1D6D34-E53B-4A44-8CD7-23C2A4E6AD02}" type="datetimeFigureOut">
               <a:rPr lang="en-US" smtClean="0"/>
-              <a:t>10/27/2015</a:t>
+              <a:t>10/29/2015</a:t>
             </a:fld>
             <a:endParaRPr lang="en-US"/>
           </a:p>
@@ -1988,7 +1989,7 @@
           <a:p>
             <a:fld id="{FE1D6D34-E53B-4A44-8CD7-23C2A4E6AD02}" type="datetimeFigureOut">
               <a:rPr lang="en-US" smtClean="0"/>
-              <a:t>10/27/2015</a:t>
+              <a:t>10/29/2015</a:t>
             </a:fld>
             <a:endParaRPr lang="en-US"/>
           </a:p>
@@ -2265,7 +2266,7 @@
           <a:p>
             <a:fld id="{FE1D6D34-E53B-4A44-8CD7-23C2A4E6AD02}" type="datetimeFigureOut">
               <a:rPr lang="en-US" smtClean="0"/>
-              <a:t>10/27/2015</a:t>
+              <a:t>10/29/2015</a:t>
             </a:fld>
             <a:endParaRPr lang="en-US"/>
           </a:p>
@@ -2518,7 +2519,7 @@
           <a:p>
             <a:fld id="{FE1D6D34-E53B-4A44-8CD7-23C2A4E6AD02}" type="datetimeFigureOut">
               <a:rPr lang="en-US" smtClean="0"/>
-              <a:t>10/27/2015</a:t>
+              <a:t>10/29/2015</a:t>
             </a:fld>
             <a:endParaRPr lang="en-US"/>
           </a:p>
@@ -2731,7 +2732,7 @@
           <a:p>
             <a:fld id="{FE1D6D34-E53B-4A44-8CD7-23C2A4E6AD02}" type="datetimeFigureOut">
               <a:rPr lang="en-US" smtClean="0"/>
-              <a:t>10/27/2015</a:t>
+              <a:t>10/29/2015</a:t>
             </a:fld>
             <a:endParaRPr lang="en-US"/>
           </a:p>
@@ -4197,6 +4198,134 @@
 </file>
 
 <file path=ppt/slides/slide12.xml><?xml version="1.0" encoding="utf-8"?>
+<p:sld xmlns:a="http://schemas.openxmlformats.org/drawingml/2006/main" xmlns:r="http://schemas.openxmlformats.org/officeDocument/2006/relationships" xmlns:p="http://schemas.openxmlformats.org/presentationml/2006/main">
+  <p:cSld>
+    <p:spTree>
+      <p:nvGrpSpPr>
+        <p:cNvPr id="1" name=""/>
+        <p:cNvGrpSpPr/>
+        <p:nvPr/>
+      </p:nvGrpSpPr>
+      <p:grpSpPr>
+        <a:xfrm>
+          <a:off x="0" y="0"/>
+          <a:ext cx="0" cy="0"/>
+          <a:chOff x="0" y="0"/>
+          <a:chExt cx="0" cy="0"/>
+        </a:xfrm>
+      </p:grpSpPr>
+      <p:sp>
+        <p:nvSpPr>
+          <p:cNvPr id="2" name="TextBox 1"/>
+          <p:cNvSpPr txBox="1"/>
+          <p:nvPr/>
+        </p:nvSpPr>
+        <p:spPr>
+          <a:xfrm>
+            <a:off x="685800" y="228600"/>
+            <a:ext cx="2313326" cy="369332"/>
+          </a:xfrm>
+          <a:prstGeom prst="rect">
+            <a:avLst/>
+          </a:prstGeom>
+          <a:noFill/>
+        </p:spPr>
+        <p:txBody>
+          <a:bodyPr wrap="none" rtlCol="0">
+            <a:spAutoFit/>
+          </a:bodyPr>
+          <a:lstStyle/>
+          <a:p>
+            <a:r>
+              <a:rPr lang="en-US" dirty="0" smtClean="0"/>
+              <a:t>On the bleaching data:</a:t>
+            </a:r>
+            <a:endParaRPr lang="en-US" dirty="0"/>
+          </a:p>
+        </p:txBody>
+      </p:sp>
+      <p:pic>
+        <p:nvPicPr>
+          <p:cNvPr id="3" name="Picture 2"/>
+          <p:cNvPicPr>
+            <a:picLocks noChangeAspect="1"/>
+          </p:cNvPicPr>
+          <p:nvPr/>
+        </p:nvPicPr>
+        <p:blipFill>
+          <a:blip r:embed="rId2" cstate="print">
+            <a:extLst>
+              <a:ext uri="{28A0092B-C50C-407E-A947-70E740481C1C}">
+                <a14:useLocalDpi xmlns:a14="http://schemas.microsoft.com/office/drawing/2010/main" val="0"/>
+              </a:ext>
+            </a:extLst>
+          </a:blip>
+          <a:stretch>
+            <a:fillRect/>
+          </a:stretch>
+        </p:blipFill>
+        <p:spPr>
+          <a:xfrm>
+            <a:off x="2667000" y="1371600"/>
+            <a:ext cx="3110820" cy="2209800"/>
+          </a:xfrm>
+          <a:prstGeom prst="rect">
+            <a:avLst/>
+          </a:prstGeom>
+        </p:spPr>
+      </p:pic>
+      <p:sp>
+        <p:nvSpPr>
+          <p:cNvPr id="4" name="TextBox 3"/>
+          <p:cNvSpPr txBox="1"/>
+          <p:nvPr/>
+        </p:nvSpPr>
+        <p:spPr>
+          <a:xfrm>
+            <a:off x="1143000" y="4223266"/>
+            <a:ext cx="7076745" cy="369332"/>
+          </a:xfrm>
+          <a:prstGeom prst="rect">
+            <a:avLst/>
+          </a:prstGeom>
+          <a:noFill/>
+        </p:spPr>
+        <p:txBody>
+          <a:bodyPr wrap="none" rtlCol="0">
+            <a:spAutoFit/>
+          </a:bodyPr>
+          <a:lstStyle/>
+          <a:p>
+            <a:r>
+              <a:rPr lang="en-US" dirty="0" smtClean="0"/>
+              <a:t>They appear to be v2, which is integrals of the fit peaks, </a:t>
+            </a:r>
+            <a:r>
+              <a:rPr lang="en-US" i="1" dirty="0" smtClean="0"/>
+              <a:t>not </a:t>
+            </a:r>
+            <a:r>
+              <a:rPr lang="en-US" dirty="0" smtClean="0"/>
+              <a:t>power-scaled.</a:t>
+            </a:r>
+            <a:endParaRPr lang="en-US" dirty="0"/>
+          </a:p>
+        </p:txBody>
+      </p:sp>
+    </p:spTree>
+    <p:extLst>
+      <p:ext uri="{BB962C8B-B14F-4D97-AF65-F5344CB8AC3E}">
+        <p14:creationId xmlns:p14="http://schemas.microsoft.com/office/powerpoint/2010/main" val="3415463932"/>
+      </p:ext>
+    </p:extLst>
+  </p:cSld>
+  <p:clrMapOvr>
+    <a:masterClrMapping/>
+  </p:clrMapOvr>
+</p:sld>
+</file>
+
+<file path=ppt/slides/slide13.xml><?xml version="1.0" encoding="utf-8"?>
 <p:sld xmlns:a="http://schemas.openxmlformats.org/drawingml/2006/main" xmlns:r="http://schemas.openxmlformats.org/officeDocument/2006/relationships" xmlns:p="http://schemas.openxmlformats.org/presentationml/2006/main">
   <p:cSld>
     <p:spTree>

</xml_diff>

<commit_message>
painstakingly getting through re-pumping.  So much time spent on something so stupid.
</commit_message>
<xml_diff>
--- a/thought_process.pptx
+++ b/thought_process.pptx
@@ -17,7 +17,8 @@
     <p:sldId id="265" r:id="rId11"/>
     <p:sldId id="266" r:id="rId12"/>
     <p:sldId id="268" r:id="rId13"/>
-    <p:sldId id="267" r:id="rId14"/>
+    <p:sldId id="269" r:id="rId14"/>
+    <p:sldId id="267" r:id="rId15"/>
   </p:sldIdLst>
   <p:sldSz cx="9144000" cy="6858000" type="screen4x3"/>
   <p:notesSz cx="6858000" cy="9144000"/>
@@ -300,7 +301,7 @@
           <a:p>
             <a:fld id="{FE1D6D34-E53B-4A44-8CD7-23C2A4E6AD02}" type="datetimeFigureOut">
               <a:rPr lang="en-US" smtClean="0"/>
-              <a:t>10/29/2015</a:t>
+              <a:t>11/3/2015</a:t>
             </a:fld>
             <a:endParaRPr lang="en-US"/>
           </a:p>
@@ -470,7 +471,7 @@
           <a:p>
             <a:fld id="{FE1D6D34-E53B-4A44-8CD7-23C2A4E6AD02}" type="datetimeFigureOut">
               <a:rPr lang="en-US" smtClean="0"/>
-              <a:t>10/29/2015</a:t>
+              <a:t>11/3/2015</a:t>
             </a:fld>
             <a:endParaRPr lang="en-US"/>
           </a:p>
@@ -650,7 +651,7 @@
           <a:p>
             <a:fld id="{FE1D6D34-E53B-4A44-8CD7-23C2A4E6AD02}" type="datetimeFigureOut">
               <a:rPr lang="en-US" smtClean="0"/>
-              <a:t>10/29/2015</a:t>
+              <a:t>11/3/2015</a:t>
             </a:fld>
             <a:endParaRPr lang="en-US"/>
           </a:p>
@@ -820,7 +821,7 @@
           <a:p>
             <a:fld id="{FE1D6D34-E53B-4A44-8CD7-23C2A4E6AD02}" type="datetimeFigureOut">
               <a:rPr lang="en-US" smtClean="0"/>
-              <a:t>10/29/2015</a:t>
+              <a:t>11/3/2015</a:t>
             </a:fld>
             <a:endParaRPr lang="en-US"/>
           </a:p>
@@ -1066,7 +1067,7 @@
           <a:p>
             <a:fld id="{FE1D6D34-E53B-4A44-8CD7-23C2A4E6AD02}" type="datetimeFigureOut">
               <a:rPr lang="en-US" smtClean="0"/>
-              <a:t>10/29/2015</a:t>
+              <a:t>11/3/2015</a:t>
             </a:fld>
             <a:endParaRPr lang="en-US"/>
           </a:p>
@@ -1354,7 +1355,7 @@
           <a:p>
             <a:fld id="{FE1D6D34-E53B-4A44-8CD7-23C2A4E6AD02}" type="datetimeFigureOut">
               <a:rPr lang="en-US" smtClean="0"/>
-              <a:t>10/29/2015</a:t>
+              <a:t>11/3/2015</a:t>
             </a:fld>
             <a:endParaRPr lang="en-US"/>
           </a:p>
@@ -1776,7 +1777,7 @@
           <a:p>
             <a:fld id="{FE1D6D34-E53B-4A44-8CD7-23C2A4E6AD02}" type="datetimeFigureOut">
               <a:rPr lang="en-US" smtClean="0"/>
-              <a:t>10/29/2015</a:t>
+              <a:t>11/3/2015</a:t>
             </a:fld>
             <a:endParaRPr lang="en-US"/>
           </a:p>
@@ -1894,7 +1895,7 @@
           <a:p>
             <a:fld id="{FE1D6D34-E53B-4A44-8CD7-23C2A4E6AD02}" type="datetimeFigureOut">
               <a:rPr lang="en-US" smtClean="0"/>
-              <a:t>10/29/2015</a:t>
+              <a:t>11/3/2015</a:t>
             </a:fld>
             <a:endParaRPr lang="en-US"/>
           </a:p>
@@ -1989,7 +1990,7 @@
           <a:p>
             <a:fld id="{FE1D6D34-E53B-4A44-8CD7-23C2A4E6AD02}" type="datetimeFigureOut">
               <a:rPr lang="en-US" smtClean="0"/>
-              <a:t>10/29/2015</a:t>
+              <a:t>11/3/2015</a:t>
             </a:fld>
             <a:endParaRPr lang="en-US"/>
           </a:p>
@@ -2266,7 +2267,7 @@
           <a:p>
             <a:fld id="{FE1D6D34-E53B-4A44-8CD7-23C2A4E6AD02}" type="datetimeFigureOut">
               <a:rPr lang="en-US" smtClean="0"/>
-              <a:t>10/29/2015</a:t>
+              <a:t>11/3/2015</a:t>
             </a:fld>
             <a:endParaRPr lang="en-US"/>
           </a:p>
@@ -2519,7 +2520,7 @@
           <a:p>
             <a:fld id="{FE1D6D34-E53B-4A44-8CD7-23C2A4E6AD02}" type="datetimeFigureOut">
               <a:rPr lang="en-US" smtClean="0"/>
-              <a:t>10/29/2015</a:t>
+              <a:t>11/3/2015</a:t>
             </a:fld>
             <a:endParaRPr lang="en-US"/>
           </a:p>
@@ -2732,7 +2733,7 @@
           <a:p>
             <a:fld id="{FE1D6D34-E53B-4A44-8CD7-23C2A4E6AD02}" type="datetimeFigureOut">
               <a:rPr lang="en-US" smtClean="0"/>
-              <a:t>10/29/2015</a:t>
+              <a:t>11/3/2015</a:t>
             </a:fld>
             <a:endParaRPr lang="en-US"/>
           </a:p>
@@ -4326,6 +4327,486 @@
 </file>
 
 <file path=ppt/slides/slide13.xml><?xml version="1.0" encoding="utf-8"?>
+<p:sld xmlns:a="http://schemas.openxmlformats.org/drawingml/2006/main" xmlns:r="http://schemas.openxmlformats.org/officeDocument/2006/relationships" xmlns:p="http://schemas.openxmlformats.org/presentationml/2006/main">
+  <p:cSld>
+    <p:spTree>
+      <p:nvGrpSpPr>
+        <p:cNvPr id="1" name=""/>
+        <p:cNvGrpSpPr/>
+        <p:nvPr/>
+      </p:nvGrpSpPr>
+      <p:grpSpPr>
+        <a:xfrm>
+          <a:off x="0" y="0"/>
+          <a:ext cx="0" cy="0"/>
+          <a:chOff x="0" y="0"/>
+          <a:chExt cx="0" cy="0"/>
+        </a:xfrm>
+      </p:grpSpPr>
+      <p:sp>
+        <p:nvSpPr>
+          <p:cNvPr id="2" name="TextBox 1"/>
+          <p:cNvSpPr txBox="1"/>
+          <p:nvPr/>
+        </p:nvSpPr>
+        <p:spPr>
+          <a:xfrm>
+            <a:off x="7777" y="33725"/>
+            <a:ext cx="1973424" cy="646331"/>
+          </a:xfrm>
+          <a:prstGeom prst="rect">
+            <a:avLst/>
+          </a:prstGeom>
+          <a:noFill/>
+        </p:spPr>
+        <p:txBody>
+          <a:bodyPr wrap="square" rtlCol="0">
+            <a:spAutoFit/>
+          </a:bodyPr>
+          <a:lstStyle/>
+          <a:p>
+            <a:r>
+              <a:rPr lang="en-US" dirty="0" smtClean="0"/>
+              <a:t>On re-pump using Kr laser:</a:t>
+            </a:r>
+            <a:endParaRPr lang="en-US" dirty="0"/>
+          </a:p>
+        </p:txBody>
+      </p:sp>
+      <p:pic>
+        <p:nvPicPr>
+          <p:cNvPr id="3" name="Picture 2"/>
+          <p:cNvPicPr>
+            <a:picLocks noChangeAspect="1"/>
+          </p:cNvPicPr>
+          <p:nvPr/>
+        </p:nvPicPr>
+        <p:blipFill>
+          <a:blip r:embed="rId2">
+            <a:extLst>
+              <a:ext uri="{28A0092B-C50C-407E-A947-70E740481C1C}">
+                <a14:useLocalDpi xmlns:a14="http://schemas.microsoft.com/office/drawing/2010/main" val="0"/>
+              </a:ext>
+            </a:extLst>
+          </a:blip>
+          <a:stretch>
+            <a:fillRect/>
+          </a:stretch>
+        </p:blipFill>
+        <p:spPr>
+          <a:xfrm>
+            <a:off x="289249" y="762000"/>
+            <a:ext cx="4038600" cy="2868857"/>
+          </a:xfrm>
+          <a:prstGeom prst="rect">
+            <a:avLst/>
+          </a:prstGeom>
+        </p:spPr>
+      </p:pic>
+      <p:pic>
+        <p:nvPicPr>
+          <p:cNvPr id="4" name="Picture 3"/>
+          <p:cNvPicPr>
+            <a:picLocks noChangeAspect="1"/>
+          </p:cNvPicPr>
+          <p:nvPr/>
+        </p:nvPicPr>
+        <p:blipFill>
+          <a:blip r:embed="rId3">
+            <a:extLst>
+              <a:ext uri="{28A0092B-C50C-407E-A947-70E740481C1C}">
+                <a14:useLocalDpi xmlns:a14="http://schemas.microsoft.com/office/drawing/2010/main" val="0"/>
+              </a:ext>
+            </a:extLst>
+          </a:blip>
+          <a:stretch>
+            <a:fillRect/>
+          </a:stretch>
+        </p:blipFill>
+        <p:spPr>
+          <a:xfrm>
+            <a:off x="289249" y="3630857"/>
+            <a:ext cx="4038600" cy="2868857"/>
+          </a:xfrm>
+          <a:prstGeom prst="rect">
+            <a:avLst/>
+          </a:prstGeom>
+        </p:spPr>
+      </p:pic>
+      <p:pic>
+        <p:nvPicPr>
+          <p:cNvPr id="5" name="Picture 4"/>
+          <p:cNvPicPr>
+            <a:picLocks noChangeAspect="1"/>
+          </p:cNvPicPr>
+          <p:nvPr/>
+        </p:nvPicPr>
+        <p:blipFill>
+          <a:blip r:embed="rId4">
+            <a:extLst>
+              <a:ext uri="{28A0092B-C50C-407E-A947-70E740481C1C}">
+                <a14:useLocalDpi xmlns:a14="http://schemas.microsoft.com/office/drawing/2010/main" val="0"/>
+              </a:ext>
+            </a:extLst>
+          </a:blip>
+          <a:stretch>
+            <a:fillRect/>
+          </a:stretch>
+        </p:blipFill>
+        <p:spPr>
+          <a:xfrm>
+            <a:off x="5257800" y="3992155"/>
+            <a:ext cx="3810000" cy="2238594"/>
+          </a:xfrm>
+          <a:prstGeom prst="rect">
+            <a:avLst/>
+          </a:prstGeom>
+        </p:spPr>
+      </p:pic>
+      <p:sp>
+        <p:nvSpPr>
+          <p:cNvPr id="6" name="TextBox 5"/>
+          <p:cNvSpPr txBox="1"/>
+          <p:nvPr/>
+        </p:nvSpPr>
+        <p:spPr>
+          <a:xfrm>
+            <a:off x="1828800" y="762000"/>
+            <a:ext cx="2111178" cy="523220"/>
+          </a:xfrm>
+          <a:prstGeom prst="rect">
+            <a:avLst/>
+          </a:prstGeom>
+          <a:noFill/>
+        </p:spPr>
+        <p:txBody>
+          <a:bodyPr wrap="square" rtlCol="0">
+            <a:spAutoFit/>
+          </a:bodyPr>
+          <a:lstStyle/>
+          <a:p>
+            <a:r>
+              <a:rPr lang="en-US" sz="1400" b="1" i="1" dirty="0" smtClean="0">
+                <a:solidFill>
+                  <a:srgbClr val="C00000"/>
+                </a:solidFill>
+              </a:rPr>
+              <a:t>These saw only the destruction w/ higher Kr</a:t>
+            </a:r>
+            <a:endParaRPr lang="en-US" sz="1400" b="1" i="1" dirty="0">
+              <a:solidFill>
+                <a:srgbClr val="C00000"/>
+              </a:solidFill>
+            </a:endParaRPr>
+          </a:p>
+        </p:txBody>
+      </p:sp>
+      <p:sp>
+        <p:nvSpPr>
+          <p:cNvPr id="7" name="TextBox 6"/>
+          <p:cNvSpPr txBox="1"/>
+          <p:nvPr/>
+        </p:nvSpPr>
+        <p:spPr>
+          <a:xfrm>
+            <a:off x="3505200" y="4803675"/>
+            <a:ext cx="2111178" cy="307777"/>
+          </a:xfrm>
+          <a:prstGeom prst="rect">
+            <a:avLst/>
+          </a:prstGeom>
+          <a:noFill/>
+        </p:spPr>
+        <p:txBody>
+          <a:bodyPr wrap="square" rtlCol="0">
+            <a:spAutoFit/>
+          </a:bodyPr>
+          <a:lstStyle/>
+          <a:p>
+            <a:r>
+              <a:rPr lang="en-US" sz="1400" b="1" i="1" dirty="0" smtClean="0">
+                <a:solidFill>
+                  <a:srgbClr val="C00000"/>
+                </a:solidFill>
+              </a:rPr>
+              <a:t>Appears to be an effect!</a:t>
+            </a:r>
+          </a:p>
+        </p:txBody>
+      </p:sp>
+      <p:sp>
+        <p:nvSpPr>
+          <p:cNvPr id="8" name="TextBox 7"/>
+          <p:cNvSpPr txBox="1"/>
+          <p:nvPr/>
+        </p:nvSpPr>
+        <p:spPr>
+          <a:xfrm>
+            <a:off x="4330959" y="4334331"/>
+            <a:ext cx="3452868" cy="307777"/>
+          </a:xfrm>
+          <a:prstGeom prst="rect">
+            <a:avLst/>
+          </a:prstGeom>
+          <a:solidFill>
+            <a:schemeClr val="bg1"/>
+          </a:solidFill>
+        </p:spPr>
+        <p:txBody>
+          <a:bodyPr wrap="none" rtlCol="0">
+            <a:spAutoFit/>
+          </a:bodyPr>
+          <a:lstStyle/>
+          <a:p>
+            <a:r>
+              <a:rPr lang="en-US" sz="1400" b="1" i="1" dirty="0">
+                <a:solidFill>
+                  <a:srgbClr val="C00000"/>
+                </a:solidFill>
+              </a:rPr>
+              <a:t> …but is it actually due to a higher baseline?</a:t>
+            </a:r>
+            <a:endParaRPr lang="en-US" sz="1400" dirty="0"/>
+          </a:p>
+        </p:txBody>
+      </p:sp>
+      <p:cxnSp>
+        <p:nvCxnSpPr>
+          <p:cNvPr id="10" name="Straight Arrow Connector 9"/>
+          <p:cNvCxnSpPr/>
+          <p:nvPr/>
+        </p:nvCxnSpPr>
+        <p:spPr>
+          <a:xfrm>
+            <a:off x="7363408" y="4608085"/>
+            <a:ext cx="228600" cy="725915"/>
+          </a:xfrm>
+          <a:prstGeom prst="straightConnector1">
+            <a:avLst/>
+          </a:prstGeom>
+          <a:ln w="19050">
+            <a:solidFill>
+              <a:srgbClr val="C00000"/>
+            </a:solidFill>
+            <a:tailEnd type="arrow"/>
+          </a:ln>
+        </p:spPr>
+        <p:style>
+          <a:lnRef idx="1">
+            <a:schemeClr val="accent1"/>
+          </a:lnRef>
+          <a:fillRef idx="0">
+            <a:schemeClr val="accent1"/>
+          </a:fillRef>
+          <a:effectRef idx="0">
+            <a:schemeClr val="accent1"/>
+          </a:effectRef>
+          <a:fontRef idx="minor">
+            <a:schemeClr val="tx1"/>
+          </a:fontRef>
+        </p:style>
+      </p:cxnSp>
+      <p:pic>
+        <p:nvPicPr>
+          <p:cNvPr id="12" name="Picture 11"/>
+          <p:cNvPicPr>
+            <a:picLocks noChangeAspect="1"/>
+          </p:cNvPicPr>
+          <p:nvPr/>
+        </p:nvPicPr>
+        <p:blipFill>
+          <a:blip r:embed="rId5" cstate="print">
+            <a:extLst>
+              <a:ext uri="{28A0092B-C50C-407E-A947-70E740481C1C}">
+                <a14:useLocalDpi xmlns:a14="http://schemas.microsoft.com/office/drawing/2010/main" val="0"/>
+              </a:ext>
+            </a:extLst>
+          </a:blip>
+          <a:stretch>
+            <a:fillRect/>
+          </a:stretch>
+        </p:blipFill>
+        <p:spPr>
+          <a:xfrm>
+            <a:off x="5916446" y="914400"/>
+            <a:ext cx="3151354" cy="2238594"/>
+          </a:xfrm>
+          <a:prstGeom prst="rect">
+            <a:avLst/>
+          </a:prstGeom>
+        </p:spPr>
+      </p:pic>
+      <p:cxnSp>
+        <p:nvCxnSpPr>
+          <p:cNvPr id="14" name="Straight Arrow Connector 13"/>
+          <p:cNvCxnSpPr/>
+          <p:nvPr/>
+        </p:nvCxnSpPr>
+        <p:spPr>
+          <a:xfrm flipV="1">
+            <a:off x="7274767" y="2819400"/>
+            <a:ext cx="509060" cy="1541685"/>
+          </a:xfrm>
+          <a:prstGeom prst="straightConnector1">
+            <a:avLst/>
+          </a:prstGeom>
+          <a:ln w="19050">
+            <a:solidFill>
+              <a:srgbClr val="C00000"/>
+            </a:solidFill>
+            <a:tailEnd type="arrow"/>
+          </a:ln>
+        </p:spPr>
+        <p:style>
+          <a:lnRef idx="1">
+            <a:schemeClr val="accent1"/>
+          </a:lnRef>
+          <a:fillRef idx="0">
+            <a:schemeClr val="accent1"/>
+          </a:fillRef>
+          <a:effectRef idx="0">
+            <a:schemeClr val="accent1"/>
+          </a:effectRef>
+          <a:fontRef idx="minor">
+            <a:schemeClr val="tx1"/>
+          </a:fontRef>
+        </p:style>
+      </p:cxnSp>
+      <p:sp>
+        <p:nvSpPr>
+          <p:cNvPr id="13" name="TextBox 12"/>
+          <p:cNvSpPr txBox="1"/>
+          <p:nvPr/>
+        </p:nvSpPr>
+        <p:spPr>
+          <a:xfrm>
+            <a:off x="5893973" y="3581400"/>
+            <a:ext cx="3167470" cy="307777"/>
+          </a:xfrm>
+          <a:prstGeom prst="rect">
+            <a:avLst/>
+          </a:prstGeom>
+          <a:solidFill>
+            <a:schemeClr val="bg1"/>
+          </a:solidFill>
+        </p:spPr>
+        <p:txBody>
+          <a:bodyPr wrap="none" rtlCol="0">
+            <a:spAutoFit/>
+          </a:bodyPr>
+          <a:lstStyle/>
+          <a:p>
+            <a:r>
+              <a:rPr lang="en-US" sz="1400" b="1" i="1" dirty="0" smtClean="0">
+                <a:solidFill>
+                  <a:srgbClr val="C00000"/>
+                </a:solidFill>
+              </a:rPr>
+              <a:t>This thing does NOT appear in set 1 runs</a:t>
+            </a:r>
+            <a:endParaRPr lang="en-US" sz="1400" dirty="0"/>
+          </a:p>
+        </p:txBody>
+      </p:sp>
+      <p:sp>
+        <p:nvSpPr>
+          <p:cNvPr id="16" name="TextBox 15"/>
+          <p:cNvSpPr txBox="1"/>
+          <p:nvPr/>
+        </p:nvSpPr>
+        <p:spPr>
+          <a:xfrm>
+            <a:off x="2133600" y="0"/>
+            <a:ext cx="7002624" cy="830997"/>
+          </a:xfrm>
+          <a:prstGeom prst="rect">
+            <a:avLst/>
+          </a:prstGeom>
+          <a:solidFill>
+            <a:schemeClr val="accent6">
+              <a:lumMod val="40000"/>
+              <a:lumOff val="60000"/>
+            </a:schemeClr>
+          </a:solidFill>
+        </p:spPr>
+        <p:txBody>
+          <a:bodyPr wrap="square" rtlCol="0">
+            <a:spAutoFit/>
+          </a:bodyPr>
+          <a:lstStyle/>
+          <a:p>
+            <a:r>
+              <a:rPr lang="en-US" sz="1200" b="1" dirty="0" smtClean="0"/>
+              <a:t>Especially since the powers are supposedly similar between these “re-pumps” and the most destructive case in the earlier ones, </a:t>
+            </a:r>
+            <a:r>
+              <a:rPr lang="en-US" sz="1200" b="1" dirty="0" smtClean="0">
+                <a:solidFill>
+                  <a:srgbClr val="FF0000"/>
+                </a:solidFill>
+              </a:rPr>
+              <a:t>this seems to be not real</a:t>
+            </a:r>
+            <a:r>
+              <a:rPr lang="en-US" sz="1200" b="1" dirty="0" smtClean="0"/>
+              <a:t>.  One difference between sets 1 and 2 is the dep. temp., but this doesn’t explain the weird baseline thing – maybe there were differences I couldn’t easily pick out of the notes.  Weird conditions were being tried to mimic those of the old separate Kr re-pumps.</a:t>
+            </a:r>
+            <a:endParaRPr lang="en-US" sz="1200" b="1" dirty="0"/>
+          </a:p>
+        </p:txBody>
+      </p:sp>
+      <p:sp>
+        <p:nvSpPr>
+          <p:cNvPr id="17" name="TextBox 16"/>
+          <p:cNvSpPr txBox="1"/>
+          <p:nvPr/>
+        </p:nvSpPr>
+        <p:spPr>
+          <a:xfrm>
+            <a:off x="5271018" y="6238525"/>
+            <a:ext cx="3810000" cy="523220"/>
+          </a:xfrm>
+          <a:prstGeom prst="rect">
+            <a:avLst/>
+          </a:prstGeom>
+          <a:noFill/>
+        </p:spPr>
+        <p:txBody>
+          <a:bodyPr wrap="square" rtlCol="0">
+            <a:spAutoFit/>
+          </a:bodyPr>
+          <a:lstStyle/>
+          <a:p>
+            <a:r>
+              <a:rPr lang="en-US" sz="1400" b="1" i="1" dirty="0" smtClean="0">
+                <a:solidFill>
+                  <a:srgbClr val="C00000"/>
+                </a:solidFill>
+              </a:rPr>
+              <a:t>Not sure what that is, cuz it’s not in the BG apparently… see above summary.</a:t>
+            </a:r>
+            <a:endParaRPr lang="en-US" sz="1400" b="1" i="1" dirty="0">
+              <a:solidFill>
+                <a:srgbClr val="C00000"/>
+              </a:solidFill>
+            </a:endParaRPr>
+          </a:p>
+        </p:txBody>
+      </p:sp>
+    </p:spTree>
+    <p:extLst>
+      <p:ext uri="{BB962C8B-B14F-4D97-AF65-F5344CB8AC3E}">
+        <p14:creationId xmlns:p14="http://schemas.microsoft.com/office/powerpoint/2010/main" val="3788940648"/>
+      </p:ext>
+    </p:extLst>
+  </p:cSld>
+  <p:clrMapOvr>
+    <a:masterClrMapping/>
+  </p:clrMapOvr>
+</p:sld>
+</file>
+
+<file path=ppt/slides/slide14.xml><?xml version="1.0" encoding="utf-8"?>
 <p:sld xmlns:a="http://schemas.openxmlformats.org/drawingml/2006/main" xmlns:r="http://schemas.openxmlformats.org/officeDocument/2006/relationships" xmlns:p="http://schemas.openxmlformats.org/presentationml/2006/main">
   <p:cSld>
     <p:spTree>

</xml_diff>

<commit_message>
starting to finish imaging
</commit_message>
<xml_diff>
--- a/thought_process.pptx
+++ b/thought_process.pptx
@@ -20,6 +20,7 @@
     <p:sldId id="269" r:id="rId14"/>
     <p:sldId id="270" r:id="rId15"/>
     <p:sldId id="267" r:id="rId16"/>
+    <p:sldId id="271" r:id="rId17"/>
   </p:sldIdLst>
   <p:sldSz cx="9144000" cy="6858000" type="screen4x3"/>
   <p:notesSz cx="6858000" cy="9144000"/>
@@ -302,7 +303,7 @@
           <a:p>
             <a:fld id="{FE1D6D34-E53B-4A44-8CD7-23C2A4E6AD02}" type="datetimeFigureOut">
               <a:rPr lang="en-US" smtClean="0"/>
-              <a:t>11/4/2015</a:t>
+              <a:t>11/9/2015</a:t>
             </a:fld>
             <a:endParaRPr lang="en-US"/>
           </a:p>
@@ -472,7 +473,7 @@
           <a:p>
             <a:fld id="{FE1D6D34-E53B-4A44-8CD7-23C2A4E6AD02}" type="datetimeFigureOut">
               <a:rPr lang="en-US" smtClean="0"/>
-              <a:t>11/4/2015</a:t>
+              <a:t>11/9/2015</a:t>
             </a:fld>
             <a:endParaRPr lang="en-US"/>
           </a:p>
@@ -652,7 +653,7 @@
           <a:p>
             <a:fld id="{FE1D6D34-E53B-4A44-8CD7-23C2A4E6AD02}" type="datetimeFigureOut">
               <a:rPr lang="en-US" smtClean="0"/>
-              <a:t>11/4/2015</a:t>
+              <a:t>11/9/2015</a:t>
             </a:fld>
             <a:endParaRPr lang="en-US"/>
           </a:p>
@@ -822,7 +823,7 @@
           <a:p>
             <a:fld id="{FE1D6D34-E53B-4A44-8CD7-23C2A4E6AD02}" type="datetimeFigureOut">
               <a:rPr lang="en-US" smtClean="0"/>
-              <a:t>11/4/2015</a:t>
+              <a:t>11/9/2015</a:t>
             </a:fld>
             <a:endParaRPr lang="en-US"/>
           </a:p>
@@ -1068,7 +1069,7 @@
           <a:p>
             <a:fld id="{FE1D6D34-E53B-4A44-8CD7-23C2A4E6AD02}" type="datetimeFigureOut">
               <a:rPr lang="en-US" smtClean="0"/>
-              <a:t>11/4/2015</a:t>
+              <a:t>11/9/2015</a:t>
             </a:fld>
             <a:endParaRPr lang="en-US"/>
           </a:p>
@@ -1356,7 +1357,7 @@
           <a:p>
             <a:fld id="{FE1D6D34-E53B-4A44-8CD7-23C2A4E6AD02}" type="datetimeFigureOut">
               <a:rPr lang="en-US" smtClean="0"/>
-              <a:t>11/4/2015</a:t>
+              <a:t>11/9/2015</a:t>
             </a:fld>
             <a:endParaRPr lang="en-US"/>
           </a:p>
@@ -1778,7 +1779,7 @@
           <a:p>
             <a:fld id="{FE1D6D34-E53B-4A44-8CD7-23C2A4E6AD02}" type="datetimeFigureOut">
               <a:rPr lang="en-US" smtClean="0"/>
-              <a:t>11/4/2015</a:t>
+              <a:t>11/9/2015</a:t>
             </a:fld>
             <a:endParaRPr lang="en-US"/>
           </a:p>
@@ -1896,7 +1897,7 @@
           <a:p>
             <a:fld id="{FE1D6D34-E53B-4A44-8CD7-23C2A4E6AD02}" type="datetimeFigureOut">
               <a:rPr lang="en-US" smtClean="0"/>
-              <a:t>11/4/2015</a:t>
+              <a:t>11/9/2015</a:t>
             </a:fld>
             <a:endParaRPr lang="en-US"/>
           </a:p>
@@ -1991,7 +1992,7 @@
           <a:p>
             <a:fld id="{FE1D6D34-E53B-4A44-8CD7-23C2A4E6AD02}" type="datetimeFigureOut">
               <a:rPr lang="en-US" smtClean="0"/>
-              <a:t>11/4/2015</a:t>
+              <a:t>11/9/2015</a:t>
             </a:fld>
             <a:endParaRPr lang="en-US"/>
           </a:p>
@@ -2268,7 +2269,7 @@
           <a:p>
             <a:fld id="{FE1D6D34-E53B-4A44-8CD7-23C2A4E6AD02}" type="datetimeFigureOut">
               <a:rPr lang="en-US" smtClean="0"/>
-              <a:t>11/4/2015</a:t>
+              <a:t>11/9/2015</a:t>
             </a:fld>
             <a:endParaRPr lang="en-US"/>
           </a:p>
@@ -2521,7 +2522,7 @@
           <a:p>
             <a:fld id="{FE1D6D34-E53B-4A44-8CD7-23C2A4E6AD02}" type="datetimeFigureOut">
               <a:rPr lang="en-US" smtClean="0"/>
-              <a:t>11/4/2015</a:t>
+              <a:t>11/9/2015</a:t>
             </a:fld>
             <a:endParaRPr lang="en-US"/>
           </a:p>
@@ -2734,7 +2735,7 @@
           <a:p>
             <a:fld id="{FE1D6D34-E53B-4A44-8CD7-23C2A4E6AD02}" type="datetimeFigureOut">
               <a:rPr lang="en-US" smtClean="0"/>
-              <a:t>11/4/2015</a:t>
+              <a:t>11/9/2015</a:t>
             </a:fld>
             <a:endParaRPr lang="en-US"/>
           </a:p>
@@ -5136,6 +5137,371 @@
     <p:extLst>
       <p:ext uri="{BB962C8B-B14F-4D97-AF65-F5344CB8AC3E}">
         <p14:creationId xmlns:p14="http://schemas.microsoft.com/office/powerpoint/2010/main" val="3503111531"/>
+      </p:ext>
+    </p:extLst>
+  </p:cSld>
+  <p:clrMapOvr>
+    <a:masterClrMapping/>
+  </p:clrMapOvr>
+</p:sld>
+</file>
+
+<file path=ppt/slides/slide16.xml><?xml version="1.0" encoding="utf-8"?>
+<p:sld xmlns:a="http://schemas.openxmlformats.org/drawingml/2006/main" xmlns:r="http://schemas.openxmlformats.org/officeDocument/2006/relationships" xmlns:p="http://schemas.openxmlformats.org/presentationml/2006/main">
+  <p:cSld>
+    <p:spTree>
+      <p:nvGrpSpPr>
+        <p:cNvPr id="1" name=""/>
+        <p:cNvGrpSpPr/>
+        <p:nvPr/>
+      </p:nvGrpSpPr>
+      <p:grpSpPr>
+        <a:xfrm>
+          <a:off x="0" y="0"/>
+          <a:ext cx="0" cy="0"/>
+          <a:chOff x="0" y="0"/>
+          <a:chExt cx="0" cy="0"/>
+        </a:xfrm>
+      </p:grpSpPr>
+      <p:pic>
+        <p:nvPicPr>
+          <p:cNvPr id="2" name="Picture 1"/>
+          <p:cNvPicPr>
+            <a:picLocks noChangeAspect="1"/>
+          </p:cNvPicPr>
+          <p:nvPr/>
+        </p:nvPicPr>
+        <p:blipFill>
+          <a:blip r:embed="rId2" cstate="print">
+            <a:extLst>
+              <a:ext uri="{28A0092B-C50C-407E-A947-70E740481C1C}">
+                <a14:useLocalDpi xmlns:a14="http://schemas.microsoft.com/office/drawing/2010/main" val="0"/>
+              </a:ext>
+            </a:extLst>
+          </a:blip>
+          <a:stretch>
+            <a:fillRect/>
+          </a:stretch>
+        </p:blipFill>
+        <p:spPr>
+          <a:xfrm>
+            <a:off x="762000" y="691555"/>
+            <a:ext cx="4722000" cy="2653164"/>
+          </a:xfrm>
+          <a:prstGeom prst="rect">
+            <a:avLst/>
+          </a:prstGeom>
+        </p:spPr>
+      </p:pic>
+      <p:pic>
+        <p:nvPicPr>
+          <p:cNvPr id="3" name="Picture 2"/>
+          <p:cNvPicPr>
+            <a:picLocks noChangeAspect="1"/>
+          </p:cNvPicPr>
+          <p:nvPr/>
+        </p:nvPicPr>
+        <p:blipFill>
+          <a:blip r:embed="rId3" cstate="print">
+            <a:extLst>
+              <a:ext uri="{28A0092B-C50C-407E-A947-70E740481C1C}">
+                <a14:useLocalDpi xmlns:a14="http://schemas.microsoft.com/office/drawing/2010/main" val="0"/>
+              </a:ext>
+            </a:extLst>
+          </a:blip>
+          <a:stretch>
+            <a:fillRect/>
+          </a:stretch>
+        </p:blipFill>
+        <p:spPr>
+          <a:xfrm>
+            <a:off x="762000" y="3733800"/>
+            <a:ext cx="4722000" cy="2653164"/>
+          </a:xfrm>
+          <a:prstGeom prst="rect">
+            <a:avLst/>
+          </a:prstGeom>
+        </p:spPr>
+      </p:pic>
+      <p:sp>
+        <p:nvSpPr>
+          <p:cNvPr id="4" name="TextBox 3"/>
+          <p:cNvSpPr txBox="1"/>
+          <p:nvPr/>
+        </p:nvSpPr>
+        <p:spPr>
+          <a:xfrm>
+            <a:off x="76200" y="120134"/>
+            <a:ext cx="3315138" cy="369332"/>
+          </a:xfrm>
+          <a:prstGeom prst="rect">
+            <a:avLst/>
+          </a:prstGeom>
+          <a:noFill/>
+        </p:spPr>
+        <p:txBody>
+          <a:bodyPr wrap="none" rtlCol="0">
+            <a:spAutoFit/>
+          </a:bodyPr>
+          <a:lstStyle/>
+          <a:p>
+            <a:r>
+              <a:rPr lang="en-US" dirty="0" smtClean="0"/>
+              <a:t>On cryo-vibration area multiplier:</a:t>
+            </a:r>
+            <a:endParaRPr lang="en-US" dirty="0"/>
+          </a:p>
+        </p:txBody>
+      </p:sp>
+      <p:sp>
+        <p:nvSpPr>
+          <p:cNvPr id="5" name="TextBox 4"/>
+          <p:cNvSpPr txBox="1"/>
+          <p:nvPr/>
+        </p:nvSpPr>
+        <p:spPr>
+          <a:xfrm>
+            <a:off x="5562600" y="1143000"/>
+            <a:ext cx="3505200" cy="1200329"/>
+          </a:xfrm>
+          <a:prstGeom prst="rect">
+            <a:avLst/>
+          </a:prstGeom>
+          <a:noFill/>
+        </p:spPr>
+        <p:txBody>
+          <a:bodyPr wrap="square" rtlCol="0">
+            <a:spAutoFit/>
+          </a:bodyPr>
+          <a:lstStyle/>
+          <a:p>
+            <a:r>
+              <a:rPr lang="en-US" dirty="0" smtClean="0"/>
+              <a:t>2.06×2.66</a:t>
+            </a:r>
+            <a:r>
+              <a:rPr lang="el-GR" dirty="0" smtClean="0"/>
+              <a:t>μ</a:t>
+            </a:r>
+            <a:r>
+              <a:rPr lang="en-US" dirty="0" smtClean="0"/>
+              <a:t>m w is around 40 </a:t>
+            </a:r>
+            <a:r>
+              <a:rPr lang="el-GR" dirty="0"/>
+              <a:t>μ</a:t>
+            </a:r>
+            <a:r>
+              <a:rPr lang="en-US" dirty="0" smtClean="0"/>
+              <a:t>m</a:t>
+            </a:r>
+            <a:r>
+              <a:rPr lang="en-US" baseline="30000" dirty="0" smtClean="0"/>
+              <a:t>2</a:t>
+            </a:r>
+            <a:r>
+              <a:rPr lang="en-US" dirty="0" smtClean="0"/>
+              <a:t> over 1/e, which is 4.65× the laser spot size of 8.6 </a:t>
+            </a:r>
+            <a:r>
+              <a:rPr lang="el-GR" dirty="0"/>
+              <a:t>μ</a:t>
+            </a:r>
+            <a:r>
+              <a:rPr lang="en-US" dirty="0" smtClean="0"/>
+              <a:t>m</a:t>
+            </a:r>
+            <a:r>
+              <a:rPr lang="en-US" baseline="30000" dirty="0" smtClean="0"/>
+              <a:t>2</a:t>
+            </a:r>
+            <a:r>
+              <a:rPr lang="en-US" dirty="0" smtClean="0"/>
+              <a:t>, and I wrote </a:t>
+            </a:r>
+            <a:r>
+              <a:rPr lang="en-US" b="1" dirty="0" smtClean="0">
+                <a:solidFill>
+                  <a:srgbClr val="FF0000"/>
+                </a:solidFill>
+              </a:rPr>
+              <a:t>5×</a:t>
+            </a:r>
+            <a:r>
+              <a:rPr lang="en-US" dirty="0" smtClean="0"/>
+              <a:t> in the thesis.</a:t>
+            </a:r>
+          </a:p>
+        </p:txBody>
+      </p:sp>
+      <p:sp>
+        <p:nvSpPr>
+          <p:cNvPr id="6" name="TextBox 5"/>
+          <p:cNvSpPr txBox="1"/>
+          <p:nvPr/>
+        </p:nvSpPr>
+        <p:spPr>
+          <a:xfrm>
+            <a:off x="5562600" y="4460217"/>
+            <a:ext cx="3505200" cy="923330"/>
+          </a:xfrm>
+          <a:prstGeom prst="rect">
+            <a:avLst/>
+          </a:prstGeom>
+          <a:noFill/>
+        </p:spPr>
+        <p:txBody>
+          <a:bodyPr wrap="square" rtlCol="0">
+            <a:spAutoFit/>
+          </a:bodyPr>
+          <a:lstStyle/>
+          <a:p>
+            <a:r>
+              <a:rPr lang="en-US" dirty="0" smtClean="0"/>
+              <a:t>5×5</a:t>
+            </a:r>
+            <a:r>
+              <a:rPr lang="el-GR" dirty="0" smtClean="0"/>
+              <a:t>μ</a:t>
+            </a:r>
+            <a:r>
+              <a:rPr lang="en-US" dirty="0" smtClean="0"/>
+              <a:t>m w is around 122 </a:t>
+            </a:r>
+            <a:r>
+              <a:rPr lang="el-GR" dirty="0"/>
+              <a:t>μ</a:t>
+            </a:r>
+            <a:r>
+              <a:rPr lang="en-US" dirty="0" smtClean="0"/>
+              <a:t>m</a:t>
+            </a:r>
+            <a:r>
+              <a:rPr lang="en-US" baseline="30000" dirty="0" smtClean="0"/>
+              <a:t>2</a:t>
+            </a:r>
+            <a:r>
+              <a:rPr lang="en-US" dirty="0" smtClean="0"/>
+              <a:t> over 1/e, which is </a:t>
+            </a:r>
+            <a:r>
+              <a:rPr lang="en-US" b="1" dirty="0" smtClean="0">
+                <a:solidFill>
+                  <a:srgbClr val="FF0000"/>
+                </a:solidFill>
+              </a:rPr>
+              <a:t>3.1×</a:t>
+            </a:r>
+            <a:r>
+              <a:rPr lang="en-US" dirty="0" smtClean="0"/>
+              <a:t> the laser spot size of 39.3 </a:t>
+            </a:r>
+            <a:r>
+              <a:rPr lang="el-GR" dirty="0"/>
+              <a:t>μ</a:t>
+            </a:r>
+            <a:r>
+              <a:rPr lang="en-US" dirty="0" smtClean="0"/>
+              <a:t>m</a:t>
+            </a:r>
+            <a:r>
+              <a:rPr lang="en-US" baseline="30000" dirty="0" smtClean="0"/>
+              <a:t>2</a:t>
+            </a:r>
+            <a:r>
+              <a:rPr lang="en-US" dirty="0" smtClean="0"/>
+              <a:t>.</a:t>
+            </a:r>
+          </a:p>
+        </p:txBody>
+      </p:sp>
+      <p:sp>
+        <p:nvSpPr>
+          <p:cNvPr id="7" name="TextBox 6"/>
+          <p:cNvSpPr txBox="1"/>
+          <p:nvPr/>
+        </p:nvSpPr>
+        <p:spPr>
+          <a:xfrm>
+            <a:off x="5562600" y="4177269"/>
+            <a:ext cx="1326773" cy="307777"/>
+          </a:xfrm>
+          <a:prstGeom prst="rect">
+            <a:avLst/>
+          </a:prstGeom>
+          <a:noFill/>
+        </p:spPr>
+        <p:txBody>
+          <a:bodyPr wrap="none" rtlCol="0">
+            <a:spAutoFit/>
+          </a:bodyPr>
+          <a:lstStyle/>
+          <a:p>
+            <a:r>
+              <a:rPr lang="en-US" sz="1400" dirty="0" smtClean="0"/>
+              <a:t>(bi-convex lens)</a:t>
+            </a:r>
+            <a:endParaRPr lang="en-US" sz="1400" dirty="0"/>
+          </a:p>
+        </p:txBody>
+      </p:sp>
+      <p:sp>
+        <p:nvSpPr>
+          <p:cNvPr id="8" name="TextBox 7"/>
+          <p:cNvSpPr txBox="1"/>
+          <p:nvPr/>
+        </p:nvSpPr>
+        <p:spPr>
+          <a:xfrm>
+            <a:off x="6705600" y="5899666"/>
+            <a:ext cx="2028056" cy="369332"/>
+          </a:xfrm>
+          <a:prstGeom prst="rect">
+            <a:avLst/>
+          </a:prstGeom>
+          <a:noFill/>
+        </p:spPr>
+        <p:txBody>
+          <a:bodyPr wrap="none" rtlCol="0">
+            <a:spAutoFit/>
+          </a:bodyPr>
+          <a:lstStyle/>
+          <a:p>
+            <a:r>
+              <a:rPr lang="en-US" b="1" dirty="0" smtClean="0">
+                <a:solidFill>
+                  <a:srgbClr val="FF0000"/>
+                </a:solidFill>
+              </a:rPr>
+              <a:t>2.5</a:t>
+            </a:r>
+            <a:r>
+              <a:rPr lang="en-US" b="1" dirty="0">
+                <a:solidFill>
+                  <a:srgbClr val="FF0000"/>
+                </a:solidFill>
+              </a:rPr>
+              <a:t>×</a:t>
+            </a:r>
+            <a:r>
+              <a:rPr lang="en-US" dirty="0" smtClean="0"/>
+              <a:t> for 6.7×6.7</a:t>
+            </a:r>
+            <a:r>
+              <a:rPr lang="el-GR" dirty="0" smtClean="0"/>
+              <a:t>μ</a:t>
+            </a:r>
+            <a:r>
+              <a:rPr lang="en-US" dirty="0"/>
+              <a:t>m</a:t>
+            </a:r>
+          </a:p>
+        </p:txBody>
+      </p:sp>
+    </p:spTree>
+    <p:extLst>
+      <p:ext uri="{BB962C8B-B14F-4D97-AF65-F5344CB8AC3E}">
+        <p14:creationId xmlns:p14="http://schemas.microsoft.com/office/powerpoint/2010/main" val="1701059508"/>
       </p:ext>
     </p:extLst>
   </p:cSld>

</xml_diff>

<commit_message>
made bleaching plots.  It was a lot of work.
</commit_message>
<xml_diff>
--- a/thought_process.pptx
+++ b/thought_process.pptx
@@ -25,6 +25,7 @@
     <p:sldId id="271" r:id="rId19"/>
     <p:sldId id="273" r:id="rId20"/>
     <p:sldId id="275" r:id="rId21"/>
+    <p:sldId id="276" r:id="rId22"/>
   </p:sldIdLst>
   <p:sldSz cx="9144000" cy="6858000" type="screen4x3"/>
   <p:notesSz cx="6858000" cy="9144000"/>
@@ -307,7 +308,7 @@
           <a:p>
             <a:fld id="{FE1D6D34-E53B-4A44-8CD7-23C2A4E6AD02}" type="datetimeFigureOut">
               <a:rPr lang="en-US" smtClean="0"/>
-              <a:t>11/20/2015</a:t>
+              <a:t>11/23/2015</a:t>
             </a:fld>
             <a:endParaRPr lang="en-US"/>
           </a:p>
@@ -477,7 +478,7 @@
           <a:p>
             <a:fld id="{FE1D6D34-E53B-4A44-8CD7-23C2A4E6AD02}" type="datetimeFigureOut">
               <a:rPr lang="en-US" smtClean="0"/>
-              <a:t>11/20/2015</a:t>
+              <a:t>11/23/2015</a:t>
             </a:fld>
             <a:endParaRPr lang="en-US"/>
           </a:p>
@@ -657,7 +658,7 @@
           <a:p>
             <a:fld id="{FE1D6D34-E53B-4A44-8CD7-23C2A4E6AD02}" type="datetimeFigureOut">
               <a:rPr lang="en-US" smtClean="0"/>
-              <a:t>11/20/2015</a:t>
+              <a:t>11/23/2015</a:t>
             </a:fld>
             <a:endParaRPr lang="en-US"/>
           </a:p>
@@ -827,7 +828,7 @@
           <a:p>
             <a:fld id="{FE1D6D34-E53B-4A44-8CD7-23C2A4E6AD02}" type="datetimeFigureOut">
               <a:rPr lang="en-US" smtClean="0"/>
-              <a:t>11/20/2015</a:t>
+              <a:t>11/23/2015</a:t>
             </a:fld>
             <a:endParaRPr lang="en-US"/>
           </a:p>
@@ -1073,7 +1074,7 @@
           <a:p>
             <a:fld id="{FE1D6D34-E53B-4A44-8CD7-23C2A4E6AD02}" type="datetimeFigureOut">
               <a:rPr lang="en-US" smtClean="0"/>
-              <a:t>11/20/2015</a:t>
+              <a:t>11/23/2015</a:t>
             </a:fld>
             <a:endParaRPr lang="en-US"/>
           </a:p>
@@ -1361,7 +1362,7 @@
           <a:p>
             <a:fld id="{FE1D6D34-E53B-4A44-8CD7-23C2A4E6AD02}" type="datetimeFigureOut">
               <a:rPr lang="en-US" smtClean="0"/>
-              <a:t>11/20/2015</a:t>
+              <a:t>11/23/2015</a:t>
             </a:fld>
             <a:endParaRPr lang="en-US"/>
           </a:p>
@@ -1783,7 +1784,7 @@
           <a:p>
             <a:fld id="{FE1D6D34-E53B-4A44-8CD7-23C2A4E6AD02}" type="datetimeFigureOut">
               <a:rPr lang="en-US" smtClean="0"/>
-              <a:t>11/20/2015</a:t>
+              <a:t>11/23/2015</a:t>
             </a:fld>
             <a:endParaRPr lang="en-US"/>
           </a:p>
@@ -1901,7 +1902,7 @@
           <a:p>
             <a:fld id="{FE1D6D34-E53B-4A44-8CD7-23C2A4E6AD02}" type="datetimeFigureOut">
               <a:rPr lang="en-US" smtClean="0"/>
-              <a:t>11/20/2015</a:t>
+              <a:t>11/23/2015</a:t>
             </a:fld>
             <a:endParaRPr lang="en-US"/>
           </a:p>
@@ -1996,7 +1997,7 @@
           <a:p>
             <a:fld id="{FE1D6D34-E53B-4A44-8CD7-23C2A4E6AD02}" type="datetimeFigureOut">
               <a:rPr lang="en-US" smtClean="0"/>
-              <a:t>11/20/2015</a:t>
+              <a:t>11/23/2015</a:t>
             </a:fld>
             <a:endParaRPr lang="en-US"/>
           </a:p>
@@ -2273,7 +2274,7 @@
           <a:p>
             <a:fld id="{FE1D6D34-E53B-4A44-8CD7-23C2A4E6AD02}" type="datetimeFigureOut">
               <a:rPr lang="en-US" smtClean="0"/>
-              <a:t>11/20/2015</a:t>
+              <a:t>11/23/2015</a:t>
             </a:fld>
             <a:endParaRPr lang="en-US"/>
           </a:p>
@@ -2526,7 +2527,7 @@
           <a:p>
             <a:fld id="{FE1D6D34-E53B-4A44-8CD7-23C2A4E6AD02}" type="datetimeFigureOut">
               <a:rPr lang="en-US" smtClean="0"/>
-              <a:t>11/20/2015</a:t>
+              <a:t>11/23/2015</a:t>
             </a:fld>
             <a:endParaRPr lang="en-US"/>
           </a:p>
@@ -2739,7 +2740,7 @@
           <a:p>
             <a:fld id="{FE1D6D34-E53B-4A44-8CD7-23C2A4E6AD02}" type="datetimeFigureOut">
               <a:rPr lang="en-US" smtClean="0"/>
-              <a:t>11/20/2015</a:t>
+              <a:t>11/23/2015</a:t>
             </a:fld>
             <a:endParaRPr lang="en-US"/>
           </a:p>
@@ -3168,6 +3169,13 @@
   <p:clrMapOvr>
     <a:masterClrMapping/>
   </p:clrMapOvr>
+  <p:timing>
+    <p:tnLst>
+      <p:par>
+        <p:cTn id="1" dur="indefinite" restart="never" nodeType="tmRoot"/>
+      </p:par>
+    </p:tnLst>
+  </p:timing>
 </p:sld>
 </file>
 
@@ -4011,6 +4019,13 @@
   <p:clrMapOvr>
     <a:masterClrMapping/>
   </p:clrMapOvr>
+  <p:timing>
+    <p:tnLst>
+      <p:par>
+        <p:cTn id="1" dur="indefinite" restart="never" nodeType="tmRoot"/>
+      </p:par>
+    </p:tnLst>
+  </p:timing>
 </p:sld>
 </file>
 
@@ -5363,6 +5378,13 @@
   <p:clrMapOvr>
     <a:masterClrMapping/>
   </p:clrMapOvr>
+  <p:timing>
+    <p:tnLst>
+      <p:par>
+        <p:cTn id="1" dur="indefinite" restart="never" nodeType="tmRoot"/>
+      </p:par>
+    </p:tnLst>
+  </p:timing>
 </p:sld>
 </file>
 
@@ -5453,6 +5475,13 @@
   <p:clrMapOvr>
     <a:masterClrMapping/>
   </p:clrMapOvr>
+  <p:timing>
+    <p:tnLst>
+      <p:par>
+        <p:cTn id="1" dur="indefinite" restart="never" nodeType="tmRoot"/>
+      </p:par>
+    </p:tnLst>
+  </p:timing>
 </p:sld>
 </file>
 
@@ -6384,6 +6413,214 @@
   <p:clrMapOvr>
     <a:masterClrMapping/>
   </p:clrMapOvr>
+  <p:timing>
+    <p:tnLst>
+      <p:par>
+        <p:cTn id="1" dur="indefinite" restart="never" nodeType="tmRoot"/>
+      </p:par>
+    </p:tnLst>
+  </p:timing>
+</p:sld>
+</file>
+
+<file path=ppt/slides/slide21.xml><?xml version="1.0" encoding="utf-8"?>
+<p:sld xmlns:a="http://schemas.openxmlformats.org/drawingml/2006/main" xmlns:r="http://schemas.openxmlformats.org/officeDocument/2006/relationships" xmlns:p="http://schemas.openxmlformats.org/presentationml/2006/main">
+  <p:cSld>
+    <p:spTree>
+      <p:nvGrpSpPr>
+        <p:cNvPr id="1" name=""/>
+        <p:cNvGrpSpPr/>
+        <p:nvPr/>
+      </p:nvGrpSpPr>
+      <p:grpSpPr>
+        <a:xfrm>
+          <a:off x="0" y="0"/>
+          <a:ext cx="0" cy="0"/>
+          <a:chOff x="0" y="0"/>
+          <a:chExt cx="0" cy="0"/>
+        </a:xfrm>
+      </p:grpSpPr>
+      <p:sp>
+        <p:nvSpPr>
+          <p:cNvPr id="2" name="TextBox 1"/>
+          <p:cNvSpPr txBox="1"/>
+          <p:nvPr/>
+        </p:nvSpPr>
+        <p:spPr>
+          <a:xfrm>
+            <a:off x="838200" y="381000"/>
+            <a:ext cx="3090077" cy="369332"/>
+          </a:xfrm>
+          <a:prstGeom prst="rect">
+            <a:avLst/>
+          </a:prstGeom>
+          <a:noFill/>
+        </p:spPr>
+        <p:txBody>
+          <a:bodyPr wrap="none" rtlCol="0">
+            <a:spAutoFit/>
+          </a:bodyPr>
+          <a:lstStyle/>
+          <a:p>
+            <a:r>
+              <a:rPr lang="en-US" dirty="0" smtClean="0"/>
+              <a:t>On Ba peak cross-section </a:t>
+            </a:r>
+            <a:r>
+              <a:rPr lang="en-US" dirty="0" err="1" smtClean="0"/>
+              <a:t>calcs</a:t>
+            </a:r>
+            <a:r>
+              <a:rPr lang="en-US" dirty="0" smtClean="0"/>
+              <a:t>:</a:t>
+            </a:r>
+            <a:endParaRPr lang="en-US" dirty="0"/>
+          </a:p>
+        </p:txBody>
+      </p:sp>
+      <p:pic>
+        <p:nvPicPr>
+          <p:cNvPr id="3" name="Picture 2"/>
+          <p:cNvPicPr>
+            <a:picLocks noChangeAspect="1"/>
+          </p:cNvPicPr>
+          <p:nvPr/>
+        </p:nvPicPr>
+        <p:blipFill>
+          <a:blip r:embed="rId2" cstate="print">
+            <a:extLst>
+              <a:ext uri="{28A0092B-C50C-407E-A947-70E740481C1C}">
+                <a14:useLocalDpi xmlns:a14="http://schemas.microsoft.com/office/drawing/2010/main" val="0"/>
+              </a:ext>
+            </a:extLst>
+          </a:blip>
+          <a:stretch>
+            <a:fillRect/>
+          </a:stretch>
+        </p:blipFill>
+        <p:spPr>
+          <a:xfrm>
+            <a:off x="381000" y="2133600"/>
+            <a:ext cx="3667125" cy="2604977"/>
+          </a:xfrm>
+          <a:prstGeom prst="rect">
+            <a:avLst/>
+          </a:prstGeom>
+        </p:spPr>
+      </p:pic>
+      <p:sp>
+        <p:nvSpPr>
+          <p:cNvPr id="4" name="TextBox 3"/>
+          <p:cNvSpPr txBox="1"/>
+          <p:nvPr/>
+        </p:nvSpPr>
+        <p:spPr>
+          <a:xfrm>
+            <a:off x="4048125" y="1600200"/>
+            <a:ext cx="5019675" cy="2862322"/>
+          </a:xfrm>
+          <a:prstGeom prst="rect">
+            <a:avLst/>
+          </a:prstGeom>
+          <a:noFill/>
+        </p:spPr>
+        <p:txBody>
+          <a:bodyPr wrap="square" rtlCol="0">
+            <a:spAutoFit/>
+          </a:bodyPr>
+          <a:lstStyle/>
+          <a:p>
+            <a:r>
+              <a:rPr lang="en-US" dirty="0" smtClean="0"/>
+              <a:t>Script is </a:t>
+            </a:r>
+            <a:r>
+              <a:rPr lang="en-US" dirty="0" err="1" smtClean="0"/>
+              <a:t>cross_section_calc</a:t>
+            </a:r>
+            <a:r>
+              <a:rPr lang="en-US" dirty="0" smtClean="0"/>
+              <a:t>() in </a:t>
+            </a:r>
+            <a:r>
+              <a:rPr lang="en-US" dirty="0" err="1" smtClean="0"/>
+              <a:t>spec_thesis.C</a:t>
+            </a:r>
+            <a:endParaRPr lang="en-US" dirty="0" smtClean="0"/>
+          </a:p>
+          <a:p>
+            <a:endParaRPr lang="en-US" dirty="0"/>
+          </a:p>
+          <a:p>
+            <a:r>
+              <a:rPr lang="en-US" dirty="0" smtClean="0"/>
+              <a:t>Uses Eqn. 2.8 in Shon’s thesis, with a normalization to put the peak at 1, though you don’t </a:t>
+            </a:r>
+            <a:r>
+              <a:rPr lang="en-US" i="1" dirty="0" smtClean="0"/>
+              <a:t>have </a:t>
+            </a:r>
+            <a:r>
+              <a:rPr lang="en-US" dirty="0" smtClean="0"/>
+              <a:t>to do this, but then you set E(nu_0) to 1.</a:t>
+            </a:r>
+          </a:p>
+          <a:p>
+            <a:r>
+              <a:rPr lang="en-US" dirty="0" smtClean="0"/>
+              <a:t>I get (m</a:t>
+            </a:r>
+            <a:r>
+              <a:rPr lang="en-US" baseline="30000" dirty="0" smtClean="0"/>
+              <a:t>2</a:t>
+            </a:r>
+            <a:r>
+              <a:rPr lang="en-US" dirty="0" smtClean="0"/>
+              <a:t>):</a:t>
+            </a:r>
+          </a:p>
+          <a:p>
+            <a:endParaRPr lang="en-US" dirty="0" smtClean="0"/>
+          </a:p>
+          <a:p>
+            <a:r>
+              <a:rPr lang="en-US" dirty="0" smtClean="0"/>
+              <a:t>577nm:  5.24E-19</a:t>
+            </a:r>
+            <a:endParaRPr lang="en-US" dirty="0"/>
+          </a:p>
+          <a:p>
+            <a:r>
+              <a:rPr lang="en-US" dirty="0" smtClean="0"/>
+              <a:t>591nm:  3.35E-19</a:t>
+            </a:r>
+          </a:p>
+          <a:p>
+            <a:r>
+              <a:rPr lang="en-US" dirty="0" smtClean="0"/>
+              <a:t>619nm:  3.11E-19</a:t>
+            </a:r>
+            <a:endParaRPr lang="en-US" dirty="0"/>
+          </a:p>
+        </p:txBody>
+      </p:sp>
+    </p:spTree>
+    <p:extLst>
+      <p:ext uri="{BB962C8B-B14F-4D97-AF65-F5344CB8AC3E}">
+        <p14:creationId xmlns:p14="http://schemas.microsoft.com/office/powerpoint/2010/main" val="200403908"/>
+      </p:ext>
+    </p:extLst>
+  </p:cSld>
+  <p:clrMapOvr>
+    <a:masterClrMapping/>
+  </p:clrMapOvr>
+  <p:timing>
+    <p:tnLst>
+      <p:par>
+        <p:cTn id="1" dur="indefinite" restart="never" nodeType="tmRoot"/>
+      </p:par>
+    </p:tnLst>
+  </p:timing>
 </p:sld>
 </file>
 
@@ -6551,6 +6788,13 @@
   <p:clrMapOvr>
     <a:masterClrMapping/>
   </p:clrMapOvr>
+  <p:timing>
+    <p:tnLst>
+      <p:par>
+        <p:cTn id="1" dur="indefinite" restart="never" nodeType="tmRoot"/>
+      </p:par>
+    </p:tnLst>
+  </p:timing>
 </p:sld>
 </file>
 
@@ -6952,6 +7196,13 @@
   <p:clrMapOvr>
     <a:masterClrMapping/>
   </p:clrMapOvr>
+  <p:timing>
+    <p:tnLst>
+      <p:par>
+        <p:cTn id="1" dur="indefinite" restart="never" nodeType="tmRoot"/>
+      </p:par>
+    </p:tnLst>
+  </p:timing>
 </p:sld>
 </file>
 
@@ -7268,6 +7519,13 @@
   <p:clrMapOvr>
     <a:masterClrMapping/>
   </p:clrMapOvr>
+  <p:timing>
+    <p:tnLst>
+      <p:par>
+        <p:cTn id="1" dur="indefinite" restart="never" nodeType="tmRoot"/>
+      </p:par>
+    </p:tnLst>
+  </p:timing>
 </p:sld>
 </file>
 
@@ -7564,6 +7822,13 @@
   <p:clrMapOvr>
     <a:masterClrMapping/>
   </p:clrMapOvr>
+  <p:timing>
+    <p:tnLst>
+      <p:par>
+        <p:cTn id="1" dur="indefinite" restart="never" nodeType="tmRoot"/>
+      </p:par>
+    </p:tnLst>
+  </p:timing>
 </p:sld>
 </file>
 

</xml_diff>

<commit_message>
final corrs -- fixed bleaching plots, and done with QE except for text
</commit_message>
<xml_diff>
--- a/thought_process.pptx
+++ b/thought_process.pptx
@@ -309,7 +309,7 @@
           <a:p>
             <a:fld id="{FE1D6D34-E53B-4A44-8CD7-23C2A4E6AD02}" type="datetimeFigureOut">
               <a:rPr lang="en-US" smtClean="0"/>
-              <a:t>12/21/2015</a:t>
+              <a:t>12/29/2015</a:t>
             </a:fld>
             <a:endParaRPr lang="en-US"/>
           </a:p>
@@ -479,7 +479,7 @@
           <a:p>
             <a:fld id="{FE1D6D34-E53B-4A44-8CD7-23C2A4E6AD02}" type="datetimeFigureOut">
               <a:rPr lang="en-US" smtClean="0"/>
-              <a:t>12/21/2015</a:t>
+              <a:t>12/29/2015</a:t>
             </a:fld>
             <a:endParaRPr lang="en-US"/>
           </a:p>
@@ -659,7 +659,7 @@
           <a:p>
             <a:fld id="{FE1D6D34-E53B-4A44-8CD7-23C2A4E6AD02}" type="datetimeFigureOut">
               <a:rPr lang="en-US" smtClean="0"/>
-              <a:t>12/21/2015</a:t>
+              <a:t>12/29/2015</a:t>
             </a:fld>
             <a:endParaRPr lang="en-US"/>
           </a:p>
@@ -829,7 +829,7 @@
           <a:p>
             <a:fld id="{FE1D6D34-E53B-4A44-8CD7-23C2A4E6AD02}" type="datetimeFigureOut">
               <a:rPr lang="en-US" smtClean="0"/>
-              <a:t>12/21/2015</a:t>
+              <a:t>12/29/2015</a:t>
             </a:fld>
             <a:endParaRPr lang="en-US"/>
           </a:p>
@@ -1075,7 +1075,7 @@
           <a:p>
             <a:fld id="{FE1D6D34-E53B-4A44-8CD7-23C2A4E6AD02}" type="datetimeFigureOut">
               <a:rPr lang="en-US" smtClean="0"/>
-              <a:t>12/21/2015</a:t>
+              <a:t>12/29/2015</a:t>
             </a:fld>
             <a:endParaRPr lang="en-US"/>
           </a:p>
@@ -1363,7 +1363,7 @@
           <a:p>
             <a:fld id="{FE1D6D34-E53B-4A44-8CD7-23C2A4E6AD02}" type="datetimeFigureOut">
               <a:rPr lang="en-US" smtClean="0"/>
-              <a:t>12/21/2015</a:t>
+              <a:t>12/29/2015</a:t>
             </a:fld>
             <a:endParaRPr lang="en-US"/>
           </a:p>
@@ -1785,7 +1785,7 @@
           <a:p>
             <a:fld id="{FE1D6D34-E53B-4A44-8CD7-23C2A4E6AD02}" type="datetimeFigureOut">
               <a:rPr lang="en-US" smtClean="0"/>
-              <a:t>12/21/2015</a:t>
+              <a:t>12/29/2015</a:t>
             </a:fld>
             <a:endParaRPr lang="en-US"/>
           </a:p>
@@ -1903,7 +1903,7 @@
           <a:p>
             <a:fld id="{FE1D6D34-E53B-4A44-8CD7-23C2A4E6AD02}" type="datetimeFigureOut">
               <a:rPr lang="en-US" smtClean="0"/>
-              <a:t>12/21/2015</a:t>
+              <a:t>12/29/2015</a:t>
             </a:fld>
             <a:endParaRPr lang="en-US"/>
           </a:p>
@@ -1998,7 +1998,7 @@
           <a:p>
             <a:fld id="{FE1D6D34-E53B-4A44-8CD7-23C2A4E6AD02}" type="datetimeFigureOut">
               <a:rPr lang="en-US" smtClean="0"/>
-              <a:t>12/21/2015</a:t>
+              <a:t>12/29/2015</a:t>
             </a:fld>
             <a:endParaRPr lang="en-US"/>
           </a:p>
@@ -2275,7 +2275,7 @@
           <a:p>
             <a:fld id="{FE1D6D34-E53B-4A44-8CD7-23C2A4E6AD02}" type="datetimeFigureOut">
               <a:rPr lang="en-US" smtClean="0"/>
-              <a:t>12/21/2015</a:t>
+              <a:t>12/29/2015</a:t>
             </a:fld>
             <a:endParaRPr lang="en-US"/>
           </a:p>
@@ -2528,7 +2528,7 @@
           <a:p>
             <a:fld id="{FE1D6D34-E53B-4A44-8CD7-23C2A4E6AD02}" type="datetimeFigureOut">
               <a:rPr lang="en-US" smtClean="0"/>
-              <a:t>12/21/2015</a:t>
+              <a:t>12/29/2015</a:t>
             </a:fld>
             <a:endParaRPr lang="en-US"/>
           </a:p>
@@ -2741,7 +2741,7 @@
           <a:p>
             <a:fld id="{FE1D6D34-E53B-4A44-8CD7-23C2A4E6AD02}" type="datetimeFigureOut">
               <a:rPr lang="en-US" smtClean="0"/>
-              <a:t>12/21/2015</a:t>
+              <a:t>12/29/2015</a:t>
             </a:fld>
             <a:endParaRPr lang="en-US"/>
           </a:p>
@@ -6680,7 +6680,7 @@
         </p:nvSpPr>
         <p:spPr>
           <a:xfrm>
-            <a:off x="838200" y="381000"/>
+            <a:off x="8238" y="11668"/>
             <a:ext cx="3090077" cy="369332"/>
           </a:xfrm>
           <a:prstGeom prst="rect">
@@ -6732,7 +6732,7 @@
         </p:blipFill>
         <p:spPr>
           <a:xfrm>
-            <a:off x="381000" y="2133600"/>
+            <a:off x="381000" y="609600"/>
             <a:ext cx="3667125" cy="2604977"/>
           </a:xfrm>
           <a:prstGeom prst="rect">
@@ -6748,7 +6748,7 @@
         </p:nvSpPr>
         <p:spPr>
           <a:xfrm>
-            <a:off x="4048125" y="1600200"/>
+            <a:off x="4048125" y="76200"/>
             <a:ext cx="5019675" cy="2862322"/>
           </a:xfrm>
           <a:prstGeom prst="rect">
@@ -6833,6 +6833,219 @@
               <a:t>619nm:  3.11E-19</a:t>
             </a:r>
             <a:endParaRPr lang="en-US" dirty="0"/>
+          </a:p>
+        </p:txBody>
+      </p:sp>
+      <p:sp>
+        <p:nvSpPr>
+          <p:cNvPr id="5" name="TextBox 4"/>
+          <p:cNvSpPr txBox="1"/>
+          <p:nvPr/>
+        </p:nvSpPr>
+        <p:spPr>
+          <a:xfrm>
+            <a:off x="39130" y="3562865"/>
+            <a:ext cx="3921073" cy="369332"/>
+          </a:xfrm>
+          <a:prstGeom prst="rect">
+            <a:avLst/>
+          </a:prstGeom>
+          <a:noFill/>
+        </p:spPr>
+        <p:txBody>
+          <a:bodyPr wrap="none" rtlCol="0">
+            <a:spAutoFit/>
+          </a:bodyPr>
+          <a:lstStyle/>
+          <a:p>
+            <a:r>
+              <a:rPr lang="en-US" dirty="0" smtClean="0"/>
+              <a:t>On cross-section used in (fixed) QE plot:</a:t>
+            </a:r>
+            <a:endParaRPr lang="en-US" dirty="0"/>
+          </a:p>
+        </p:txBody>
+      </p:sp>
+      <p:sp>
+        <p:nvSpPr>
+          <p:cNvPr id="6" name="TextBox 5"/>
+          <p:cNvSpPr txBox="1"/>
+          <p:nvPr/>
+        </p:nvSpPr>
+        <p:spPr>
+          <a:xfrm>
+            <a:off x="669795" y="4191000"/>
+            <a:ext cx="8398005" cy="646331"/>
+          </a:xfrm>
+          <a:prstGeom prst="rect">
+            <a:avLst/>
+          </a:prstGeom>
+          <a:noFill/>
+        </p:spPr>
+        <p:txBody>
+          <a:bodyPr wrap="none" rtlCol="0">
+            <a:spAutoFit/>
+          </a:bodyPr>
+          <a:lstStyle/>
+          <a:p>
+            <a:r>
+              <a:rPr lang="en-US" dirty="0" smtClean="0"/>
+              <a:t>591 peak:  ~91% of peak excitation at </a:t>
+            </a:r>
+            <a:r>
+              <a:rPr lang="en-US" i="1" dirty="0" smtClean="0"/>
+              <a:t>both </a:t>
+            </a:r>
+            <a:r>
+              <a:rPr lang="en-US" dirty="0" smtClean="0"/>
+              <a:t>of the used excitations (562.6 and 556.9 nm)</a:t>
+            </a:r>
+          </a:p>
+          <a:p>
+            <a:r>
+              <a:rPr lang="en-US" dirty="0" smtClean="0"/>
+              <a:t>577 peak:  ~90% of peak is probably good, with the used 566.3 nm excitation</a:t>
+            </a:r>
+            <a:endParaRPr lang="en-US" dirty="0"/>
+          </a:p>
+        </p:txBody>
+      </p:sp>
+      <p:pic>
+        <p:nvPicPr>
+          <p:cNvPr id="7" name="Picture 6"/>
+          <p:cNvPicPr>
+            <a:picLocks noChangeAspect="1"/>
+          </p:cNvPicPr>
+          <p:nvPr/>
+        </p:nvPicPr>
+        <p:blipFill>
+          <a:blip r:embed="rId3" cstate="print">
+            <a:extLst>
+              <a:ext uri="{28A0092B-C50C-407E-A947-70E740481C1C}">
+                <a14:useLocalDpi xmlns:a14="http://schemas.microsoft.com/office/drawing/2010/main" val="0"/>
+              </a:ext>
+            </a:extLst>
+          </a:blip>
+          <a:stretch>
+            <a:fillRect/>
+          </a:stretch>
+        </p:blipFill>
+        <p:spPr>
+          <a:xfrm>
+            <a:off x="838200" y="4726425"/>
+            <a:ext cx="2895422" cy="2056790"/>
+          </a:xfrm>
+          <a:prstGeom prst="rect">
+            <a:avLst/>
+          </a:prstGeom>
+        </p:spPr>
+      </p:pic>
+      <p:pic>
+        <p:nvPicPr>
+          <p:cNvPr id="8" name="Picture 7"/>
+          <p:cNvPicPr>
+            <a:picLocks noChangeAspect="1"/>
+          </p:cNvPicPr>
+          <p:nvPr/>
+        </p:nvPicPr>
+        <p:blipFill>
+          <a:blip r:embed="rId4" cstate="print">
+            <a:extLst>
+              <a:ext uri="{28A0092B-C50C-407E-A947-70E740481C1C}">
+                <a14:useLocalDpi xmlns:a14="http://schemas.microsoft.com/office/drawing/2010/main" val="0"/>
+              </a:ext>
+            </a:extLst>
+          </a:blip>
+          <a:stretch>
+            <a:fillRect/>
+          </a:stretch>
+        </p:blipFill>
+        <p:spPr>
+          <a:xfrm>
+            <a:off x="5410017" y="4726168"/>
+            <a:ext cx="2895783" cy="2057047"/>
+          </a:xfrm>
+          <a:prstGeom prst="rect">
+            <a:avLst/>
+          </a:prstGeom>
+        </p:spPr>
+      </p:pic>
+      <p:sp>
+        <p:nvSpPr>
+          <p:cNvPr id="9" name="Right Arrow 8"/>
+          <p:cNvSpPr/>
+          <p:nvPr/>
+        </p:nvSpPr>
+        <p:spPr>
+          <a:xfrm>
+            <a:off x="4343400" y="5602420"/>
+            <a:ext cx="677797" cy="152400"/>
+          </a:xfrm>
+          <a:prstGeom prst="rightArrow">
+            <a:avLst/>
+          </a:prstGeom>
+        </p:spPr>
+        <p:style>
+          <a:lnRef idx="2">
+            <a:schemeClr val="accent1">
+              <a:shade val="50000"/>
+            </a:schemeClr>
+          </a:lnRef>
+          <a:fillRef idx="1">
+            <a:schemeClr val="accent1"/>
+          </a:fillRef>
+          <a:effectRef idx="0">
+            <a:schemeClr val="accent1"/>
+          </a:effectRef>
+          <a:fontRef idx="minor">
+            <a:schemeClr val="lt1"/>
+          </a:fontRef>
+        </p:style>
+        <p:txBody>
+          <a:bodyPr rtlCol="0" anchor="ctr"/>
+          <a:lstStyle/>
+          <a:p>
+            <a:pPr algn="ctr"/>
+            <a:endParaRPr lang="en-US"/>
+          </a:p>
+        </p:txBody>
+      </p:sp>
+      <p:sp>
+        <p:nvSpPr>
+          <p:cNvPr id="10" name="TextBox 9"/>
+          <p:cNvSpPr txBox="1"/>
+          <p:nvPr/>
+        </p:nvSpPr>
+        <p:spPr>
+          <a:xfrm>
+            <a:off x="3762806" y="5079200"/>
+            <a:ext cx="1647211" cy="523220"/>
+          </a:xfrm>
+          <a:prstGeom prst="rect">
+            <a:avLst/>
+          </a:prstGeom>
+          <a:noFill/>
+        </p:spPr>
+        <p:txBody>
+          <a:bodyPr wrap="square" rtlCol="0">
+            <a:spAutoFit/>
+          </a:bodyPr>
+          <a:lstStyle/>
+          <a:p>
+            <a:pPr algn="ctr"/>
+            <a:r>
+              <a:rPr lang="en-US" sz="1400" b="1" i="1" dirty="0" smtClean="0">
+                <a:solidFill>
+                  <a:srgbClr val="C00000"/>
+                </a:solidFill>
+              </a:rPr>
+              <a:t>correct with specific cross sections</a:t>
+            </a:r>
+            <a:endParaRPr lang="en-US" sz="1400" b="1" i="1" dirty="0">
+              <a:solidFill>
+                <a:srgbClr val="C00000"/>
+              </a:solidFill>
+            </a:endParaRPr>
           </a:p>
         </p:txBody>
       </p:sp>

</xml_diff>

<commit_message>
finished all corrs (!) except one thing about Cr3+, and pending confirmation of CCD gain.
</commit_message>
<xml_diff>
--- a/thought_process.pptx
+++ b/thought_process.pptx
@@ -27,6 +27,8 @@
     <p:sldId id="273" r:id="rId21"/>
     <p:sldId id="275" r:id="rId22"/>
     <p:sldId id="276" r:id="rId23"/>
+    <p:sldId id="278" r:id="rId24"/>
+    <p:sldId id="279" r:id="rId25"/>
   </p:sldIdLst>
   <p:sldSz cx="9144000" cy="6858000" type="screen4x3"/>
   <p:notesSz cx="6858000" cy="9144000"/>
@@ -309,7 +311,7 @@
           <a:p>
             <a:fld id="{FE1D6D34-E53B-4A44-8CD7-23C2A4E6AD02}" type="datetimeFigureOut">
               <a:rPr lang="en-US" smtClean="0"/>
-              <a:t>12/29/2015</a:t>
+              <a:t>12/31/2015</a:t>
             </a:fld>
             <a:endParaRPr lang="en-US"/>
           </a:p>
@@ -479,7 +481,7 @@
           <a:p>
             <a:fld id="{FE1D6D34-E53B-4A44-8CD7-23C2A4E6AD02}" type="datetimeFigureOut">
               <a:rPr lang="en-US" smtClean="0"/>
-              <a:t>12/29/2015</a:t>
+              <a:t>12/31/2015</a:t>
             </a:fld>
             <a:endParaRPr lang="en-US"/>
           </a:p>
@@ -659,7 +661,7 @@
           <a:p>
             <a:fld id="{FE1D6D34-E53B-4A44-8CD7-23C2A4E6AD02}" type="datetimeFigureOut">
               <a:rPr lang="en-US" smtClean="0"/>
-              <a:t>12/29/2015</a:t>
+              <a:t>12/31/2015</a:t>
             </a:fld>
             <a:endParaRPr lang="en-US"/>
           </a:p>
@@ -829,7 +831,7 @@
           <a:p>
             <a:fld id="{FE1D6D34-E53B-4A44-8CD7-23C2A4E6AD02}" type="datetimeFigureOut">
               <a:rPr lang="en-US" smtClean="0"/>
-              <a:t>12/29/2015</a:t>
+              <a:t>12/31/2015</a:t>
             </a:fld>
             <a:endParaRPr lang="en-US"/>
           </a:p>
@@ -1075,7 +1077,7 @@
           <a:p>
             <a:fld id="{FE1D6D34-E53B-4A44-8CD7-23C2A4E6AD02}" type="datetimeFigureOut">
               <a:rPr lang="en-US" smtClean="0"/>
-              <a:t>12/29/2015</a:t>
+              <a:t>12/31/2015</a:t>
             </a:fld>
             <a:endParaRPr lang="en-US"/>
           </a:p>
@@ -1363,7 +1365,7 @@
           <a:p>
             <a:fld id="{FE1D6D34-E53B-4A44-8CD7-23C2A4E6AD02}" type="datetimeFigureOut">
               <a:rPr lang="en-US" smtClean="0"/>
-              <a:t>12/29/2015</a:t>
+              <a:t>12/31/2015</a:t>
             </a:fld>
             <a:endParaRPr lang="en-US"/>
           </a:p>
@@ -1785,7 +1787,7 @@
           <a:p>
             <a:fld id="{FE1D6D34-E53B-4A44-8CD7-23C2A4E6AD02}" type="datetimeFigureOut">
               <a:rPr lang="en-US" smtClean="0"/>
-              <a:t>12/29/2015</a:t>
+              <a:t>12/31/2015</a:t>
             </a:fld>
             <a:endParaRPr lang="en-US"/>
           </a:p>
@@ -1903,7 +1905,7 @@
           <a:p>
             <a:fld id="{FE1D6D34-E53B-4A44-8CD7-23C2A4E6AD02}" type="datetimeFigureOut">
               <a:rPr lang="en-US" smtClean="0"/>
-              <a:t>12/29/2015</a:t>
+              <a:t>12/31/2015</a:t>
             </a:fld>
             <a:endParaRPr lang="en-US"/>
           </a:p>
@@ -1998,7 +2000,7 @@
           <a:p>
             <a:fld id="{FE1D6D34-E53B-4A44-8CD7-23C2A4E6AD02}" type="datetimeFigureOut">
               <a:rPr lang="en-US" smtClean="0"/>
-              <a:t>12/29/2015</a:t>
+              <a:t>12/31/2015</a:t>
             </a:fld>
             <a:endParaRPr lang="en-US"/>
           </a:p>
@@ -2275,7 +2277,7 @@
           <a:p>
             <a:fld id="{FE1D6D34-E53B-4A44-8CD7-23C2A4E6AD02}" type="datetimeFigureOut">
               <a:rPr lang="en-US" smtClean="0"/>
-              <a:t>12/29/2015</a:t>
+              <a:t>12/31/2015</a:t>
             </a:fld>
             <a:endParaRPr lang="en-US"/>
           </a:p>
@@ -2528,7 +2530,7 @@
           <a:p>
             <a:fld id="{FE1D6D34-E53B-4A44-8CD7-23C2A4E6AD02}" type="datetimeFigureOut">
               <a:rPr lang="en-US" smtClean="0"/>
-              <a:t>12/29/2015</a:t>
+              <a:t>12/31/2015</a:t>
             </a:fld>
             <a:endParaRPr lang="en-US"/>
           </a:p>
@@ -2741,7 +2743,7 @@
           <a:p>
             <a:fld id="{FE1D6D34-E53B-4A44-8CD7-23C2A4E6AD02}" type="datetimeFigureOut">
               <a:rPr lang="en-US" smtClean="0"/>
-              <a:t>12/29/2015</a:t>
+              <a:t>12/31/2015</a:t>
             </a:fld>
             <a:endParaRPr lang="en-US"/>
           </a:p>
@@ -7066,6 +7068,626 @@
       </p:par>
     </p:tnLst>
   </p:timing>
+</p:sld>
+</file>
+
+<file path=ppt/slides/slide23.xml><?xml version="1.0" encoding="utf-8"?>
+<p:sld xmlns:a="http://schemas.openxmlformats.org/drawingml/2006/main" xmlns:r="http://schemas.openxmlformats.org/officeDocument/2006/relationships" xmlns:p="http://schemas.openxmlformats.org/presentationml/2006/main">
+  <p:cSld>
+    <p:spTree>
+      <p:nvGrpSpPr>
+        <p:cNvPr id="1" name=""/>
+        <p:cNvGrpSpPr/>
+        <p:nvPr/>
+      </p:nvGrpSpPr>
+      <p:grpSpPr>
+        <a:xfrm>
+          <a:off x="0" y="0"/>
+          <a:ext cx="0" cy="0"/>
+          <a:chOff x="0" y="0"/>
+          <a:chExt cx="0" cy="0"/>
+        </a:xfrm>
+      </p:grpSpPr>
+      <p:sp>
+        <p:nvSpPr>
+          <p:cNvPr id="2" name="TextBox 1"/>
+          <p:cNvSpPr txBox="1"/>
+          <p:nvPr/>
+        </p:nvSpPr>
+        <p:spPr>
+          <a:xfrm>
+            <a:off x="533400" y="304800"/>
+            <a:ext cx="2851678" cy="369332"/>
+          </a:xfrm>
+          <a:prstGeom prst="rect">
+            <a:avLst/>
+          </a:prstGeom>
+          <a:noFill/>
+        </p:spPr>
+        <p:txBody>
+          <a:bodyPr wrap="none" rtlCol="0">
+            <a:spAutoFit/>
+          </a:bodyPr>
+          <a:lstStyle/>
+          <a:p>
+            <a:r>
+              <a:rPr lang="en-US" dirty="0" smtClean="0"/>
+              <a:t>CCD counts / photoelectron:</a:t>
+            </a:r>
+            <a:endParaRPr lang="en-US" dirty="0"/>
+          </a:p>
+        </p:txBody>
+      </p:sp>
+      <p:sp>
+        <p:nvSpPr>
+          <p:cNvPr id="3" name="TextBox 2"/>
+          <p:cNvSpPr txBox="1"/>
+          <p:nvPr/>
+        </p:nvSpPr>
+        <p:spPr>
+          <a:xfrm>
+            <a:off x="304800" y="990600"/>
+            <a:ext cx="8663654" cy="2308324"/>
+          </a:xfrm>
+          <a:prstGeom prst="rect">
+            <a:avLst/>
+          </a:prstGeom>
+          <a:noFill/>
+        </p:spPr>
+        <p:txBody>
+          <a:bodyPr wrap="none" rtlCol="0">
+            <a:spAutoFit/>
+          </a:bodyPr>
+          <a:lstStyle/>
+          <a:p>
+            <a:r>
+              <a:rPr lang="en-US" dirty="0" smtClean="0"/>
+              <a:t>We have been on </a:t>
+            </a:r>
+            <a:r>
+              <a:rPr lang="en-US" b="1" dirty="0" smtClean="0"/>
+              <a:t>medium gain</a:t>
+            </a:r>
+            <a:r>
+              <a:rPr lang="en-US" dirty="0" smtClean="0"/>
+              <a:t>, which is 4 photons per 1 count according to the manual.</a:t>
+            </a:r>
+          </a:p>
+          <a:p>
+            <a:r>
+              <a:rPr lang="en-US" dirty="0" smtClean="0"/>
+              <a:t>Checks:</a:t>
+            </a:r>
+          </a:p>
+          <a:p>
+            <a:pPr marL="342900" indent="-342900">
+              <a:buAutoNum type="arabicParenR"/>
+            </a:pPr>
+            <a:r>
+              <a:rPr lang="en-US" dirty="0" smtClean="0"/>
+              <a:t>No difference in # counts </a:t>
+            </a:r>
+            <a:r>
+              <a:rPr lang="en-US" i="1" dirty="0" smtClean="0"/>
+              <a:t>(after dark subtraction)</a:t>
+            </a:r>
+            <a:r>
+              <a:rPr lang="en-US" dirty="0" smtClean="0"/>
+              <a:t> between FAST and SLOW:</a:t>
+            </a:r>
+          </a:p>
+          <a:p>
+            <a:pPr marL="342900" indent="-342900">
+              <a:buAutoNum type="arabicParenR"/>
+            </a:pPr>
+            <a:endParaRPr lang="en-US" dirty="0"/>
+          </a:p>
+          <a:p>
+            <a:pPr marL="342900" indent="-342900">
+              <a:buAutoNum type="arabicParenR"/>
+            </a:pPr>
+            <a:endParaRPr lang="en-US" dirty="0" smtClean="0"/>
+          </a:p>
+          <a:p>
+            <a:pPr marL="342900" indent="-342900">
+              <a:buAutoNum type="arabicParenR"/>
+            </a:pPr>
+            <a:endParaRPr lang="en-US" dirty="0"/>
+          </a:p>
+          <a:p>
+            <a:pPr marL="342900" indent="-342900">
+              <a:buAutoNum type="arabicParenR"/>
+            </a:pPr>
+            <a:endParaRPr lang="en-US" dirty="0" smtClean="0"/>
+          </a:p>
+          <a:p>
+            <a:pPr marL="342900" indent="-342900">
+              <a:buAutoNum type="arabicParenR"/>
+            </a:pPr>
+            <a:r>
+              <a:rPr lang="en-US" dirty="0" smtClean="0"/>
+              <a:t>Proper difference in </a:t>
+            </a:r>
+            <a:r>
+              <a:rPr lang="en-US" dirty="0"/>
+              <a:t># counts </a:t>
+            </a:r>
+            <a:r>
+              <a:rPr lang="en-US" i="1" dirty="0"/>
+              <a:t>(after dark subtraction</a:t>
+            </a:r>
+            <a:r>
+              <a:rPr lang="en-US" i="1" dirty="0" smtClean="0"/>
+              <a:t>) </a:t>
+            </a:r>
+            <a:r>
+              <a:rPr lang="en-US" dirty="0" smtClean="0"/>
+              <a:t>between Low, Medium, High gain:</a:t>
+            </a:r>
+            <a:endParaRPr lang="en-US" dirty="0"/>
+          </a:p>
+        </p:txBody>
+      </p:sp>
+      <p:sp>
+        <p:nvSpPr>
+          <p:cNvPr id="4" name="TextBox 3"/>
+          <p:cNvSpPr txBox="1"/>
+          <p:nvPr/>
+        </p:nvSpPr>
+        <p:spPr>
+          <a:xfrm>
+            <a:off x="3429000" y="2223700"/>
+            <a:ext cx="718466" cy="276999"/>
+          </a:xfrm>
+          <a:prstGeom prst="rect">
+            <a:avLst/>
+          </a:prstGeom>
+          <a:noFill/>
+        </p:spPr>
+        <p:txBody>
+          <a:bodyPr wrap="none" rtlCol="0">
+            <a:spAutoFit/>
+          </a:bodyPr>
+          <a:lstStyle/>
+          <a:p>
+            <a:r>
+              <a:rPr lang="en-US" sz="1200" b="1" dirty="0" smtClean="0"/>
+              <a:t>(do this)</a:t>
+            </a:r>
+            <a:endParaRPr lang="en-US" sz="1200" b="1" dirty="0"/>
+          </a:p>
+        </p:txBody>
+      </p:sp>
+      <p:sp>
+        <p:nvSpPr>
+          <p:cNvPr id="5" name="TextBox 4"/>
+          <p:cNvSpPr txBox="1"/>
+          <p:nvPr/>
+        </p:nvSpPr>
+        <p:spPr>
+          <a:xfrm>
+            <a:off x="3466070" y="3581400"/>
+            <a:ext cx="718466" cy="276999"/>
+          </a:xfrm>
+          <a:prstGeom prst="rect">
+            <a:avLst/>
+          </a:prstGeom>
+          <a:noFill/>
+        </p:spPr>
+        <p:txBody>
+          <a:bodyPr wrap="none" rtlCol="0">
+            <a:spAutoFit/>
+          </a:bodyPr>
+          <a:lstStyle/>
+          <a:p>
+            <a:r>
+              <a:rPr lang="en-US" sz="1200" b="1" dirty="0" smtClean="0"/>
+              <a:t>(do this)</a:t>
+            </a:r>
+            <a:endParaRPr lang="en-US" sz="1200" b="1" dirty="0"/>
+          </a:p>
+        </p:txBody>
+      </p:sp>
+    </p:spTree>
+    <p:extLst>
+      <p:ext uri="{BB962C8B-B14F-4D97-AF65-F5344CB8AC3E}">
+        <p14:creationId xmlns:p14="http://schemas.microsoft.com/office/powerpoint/2010/main" val="1721652325"/>
+      </p:ext>
+    </p:extLst>
+  </p:cSld>
+  <p:clrMapOvr>
+    <a:masterClrMapping/>
+  </p:clrMapOvr>
+</p:sld>
+</file>
+
+<file path=ppt/slides/slide24.xml><?xml version="1.0" encoding="utf-8"?>
+<p:sld xmlns:a="http://schemas.openxmlformats.org/drawingml/2006/main" xmlns:r="http://schemas.openxmlformats.org/officeDocument/2006/relationships" xmlns:p="http://schemas.openxmlformats.org/presentationml/2006/main">
+  <p:cSld>
+    <p:spTree>
+      <p:nvGrpSpPr>
+        <p:cNvPr id="1" name=""/>
+        <p:cNvGrpSpPr/>
+        <p:nvPr/>
+      </p:nvGrpSpPr>
+      <p:grpSpPr>
+        <a:xfrm>
+          <a:off x="0" y="0"/>
+          <a:ext cx="0" cy="0"/>
+          <a:chOff x="0" y="0"/>
+          <a:chExt cx="0" cy="0"/>
+        </a:xfrm>
+      </p:grpSpPr>
+      <p:sp>
+        <p:nvSpPr>
+          <p:cNvPr id="2" name="TextBox 1"/>
+          <p:cNvSpPr txBox="1"/>
+          <p:nvPr/>
+        </p:nvSpPr>
+        <p:spPr>
+          <a:xfrm>
+            <a:off x="76200" y="75511"/>
+            <a:ext cx="2080506" cy="369332"/>
+          </a:xfrm>
+          <a:prstGeom prst="rect">
+            <a:avLst/>
+          </a:prstGeom>
+          <a:noFill/>
+        </p:spPr>
+        <p:txBody>
+          <a:bodyPr wrap="none" rtlCol="0">
+            <a:spAutoFit/>
+          </a:bodyPr>
+          <a:lstStyle/>
+          <a:p>
+            <a:r>
+              <a:rPr lang="en-US" dirty="0" smtClean="0">
+                <a:solidFill>
+                  <a:srgbClr val="C00000"/>
+                </a:solidFill>
+              </a:rPr>
+              <a:t>NUMBER OF ATOMS</a:t>
+            </a:r>
+            <a:endParaRPr lang="en-US" dirty="0">
+              <a:solidFill>
+                <a:srgbClr val="C00000"/>
+              </a:solidFill>
+            </a:endParaRPr>
+          </a:p>
+        </p:txBody>
+      </p:sp>
+      <p:pic>
+        <p:nvPicPr>
+          <p:cNvPr id="3" name="Picture 2"/>
+          <p:cNvPicPr>
+            <a:picLocks noChangeAspect="1"/>
+          </p:cNvPicPr>
+          <p:nvPr/>
+        </p:nvPicPr>
+        <p:blipFill>
+          <a:blip r:embed="rId2">
+            <a:extLst>
+              <a:ext uri="{28A0092B-C50C-407E-A947-70E740481C1C}">
+                <a14:useLocalDpi xmlns:a14="http://schemas.microsoft.com/office/drawing/2010/main" val="0"/>
+              </a:ext>
+            </a:extLst>
+          </a:blip>
+          <a:stretch>
+            <a:fillRect/>
+          </a:stretch>
+        </p:blipFill>
+        <p:spPr>
+          <a:xfrm>
+            <a:off x="4735730" y="457200"/>
+            <a:ext cx="3375989" cy="3274200"/>
+          </a:xfrm>
+          <a:prstGeom prst="rect">
+            <a:avLst/>
+          </a:prstGeom>
+        </p:spPr>
+      </p:pic>
+      <p:pic>
+        <p:nvPicPr>
+          <p:cNvPr id="4" name="Picture 3"/>
+          <p:cNvPicPr>
+            <a:picLocks noChangeAspect="1"/>
+          </p:cNvPicPr>
+          <p:nvPr/>
+        </p:nvPicPr>
+        <p:blipFill>
+          <a:blip r:embed="rId3">
+            <a:extLst>
+              <a:ext uri="{28A0092B-C50C-407E-A947-70E740481C1C}">
+                <a14:useLocalDpi xmlns:a14="http://schemas.microsoft.com/office/drawing/2010/main" val="0"/>
+              </a:ext>
+            </a:extLst>
+          </a:blip>
+          <a:stretch>
+            <a:fillRect/>
+          </a:stretch>
+        </p:blipFill>
+        <p:spPr>
+          <a:xfrm>
+            <a:off x="1355622" y="457200"/>
+            <a:ext cx="3375989" cy="3274200"/>
+          </a:xfrm>
+          <a:prstGeom prst="rect">
+            <a:avLst/>
+          </a:prstGeom>
+        </p:spPr>
+      </p:pic>
+      <p:sp>
+        <p:nvSpPr>
+          <p:cNvPr id="5" name="TextBox 4"/>
+          <p:cNvSpPr txBox="1"/>
+          <p:nvPr/>
+        </p:nvSpPr>
+        <p:spPr>
+          <a:xfrm>
+            <a:off x="5473784" y="1143000"/>
+            <a:ext cx="1899879" cy="369332"/>
+          </a:xfrm>
+          <a:prstGeom prst="rect">
+            <a:avLst/>
+          </a:prstGeom>
+          <a:noFill/>
+        </p:spPr>
+        <p:txBody>
+          <a:bodyPr wrap="none" rtlCol="0">
+            <a:spAutoFit/>
+          </a:bodyPr>
+          <a:lstStyle/>
+          <a:p>
+            <a:r>
+              <a:rPr lang="en-US" dirty="0" smtClean="0">
+                <a:solidFill>
+                  <a:schemeClr val="bg1">
+                    <a:lumMod val="50000"/>
+                  </a:schemeClr>
+                </a:solidFill>
+              </a:rPr>
+              <a:t>slope = 13.2 +- 0.9</a:t>
+            </a:r>
+            <a:endParaRPr lang="en-US" dirty="0">
+              <a:solidFill>
+                <a:schemeClr val="bg1">
+                  <a:lumMod val="50000"/>
+                </a:schemeClr>
+              </a:solidFill>
+            </a:endParaRPr>
+          </a:p>
+        </p:txBody>
+      </p:sp>
+      <p:sp>
+        <p:nvSpPr>
+          <p:cNvPr id="6" name="TextBox 5"/>
+          <p:cNvSpPr txBox="1"/>
+          <p:nvPr/>
+        </p:nvSpPr>
+        <p:spPr>
+          <a:xfrm>
+            <a:off x="1905000" y="1100437"/>
+            <a:ext cx="2018501" cy="369332"/>
+          </a:xfrm>
+          <a:prstGeom prst="rect">
+            <a:avLst/>
+          </a:prstGeom>
+          <a:noFill/>
+        </p:spPr>
+        <p:txBody>
+          <a:bodyPr wrap="none" rtlCol="0">
+            <a:spAutoFit/>
+          </a:bodyPr>
+          <a:lstStyle/>
+          <a:p>
+            <a:r>
+              <a:rPr lang="en-US" dirty="0" smtClean="0">
+                <a:solidFill>
+                  <a:schemeClr val="bg1">
+                    <a:lumMod val="50000"/>
+                  </a:schemeClr>
+                </a:solidFill>
+              </a:rPr>
+              <a:t>slope = 2153 +- 226</a:t>
+            </a:r>
+            <a:endParaRPr lang="en-US" dirty="0">
+              <a:solidFill>
+                <a:schemeClr val="bg1">
+                  <a:lumMod val="50000"/>
+                </a:schemeClr>
+              </a:solidFill>
+            </a:endParaRPr>
+          </a:p>
+        </p:txBody>
+      </p:sp>
+      <p:sp>
+        <p:nvSpPr>
+          <p:cNvPr id="7" name="TextBox 6"/>
+          <p:cNvSpPr txBox="1"/>
+          <p:nvPr/>
+        </p:nvSpPr>
+        <p:spPr>
+          <a:xfrm>
+            <a:off x="98854" y="3731400"/>
+            <a:ext cx="4724400" cy="2462213"/>
+          </a:xfrm>
+          <a:prstGeom prst="rect">
+            <a:avLst/>
+          </a:prstGeom>
+          <a:noFill/>
+        </p:spPr>
+        <p:txBody>
+          <a:bodyPr wrap="square" rtlCol="0">
+            <a:spAutoFit/>
+          </a:bodyPr>
+          <a:lstStyle/>
+          <a:p>
+            <a:r>
+              <a:rPr lang="en-US" sz="1400" dirty="0" smtClean="0"/>
+              <a:t>These are after a correction of 0.8 for the window angle.  This would be negligible if the laser were going straight at the sample like the ion beam does, but refraction puts it at an angle, resulting in this correction.</a:t>
+            </a:r>
+          </a:p>
+          <a:p>
+            <a:r>
+              <a:rPr lang="en-US" sz="1400" dirty="0" smtClean="0"/>
+              <a:t>2015-05-26 goes </a:t>
+            </a:r>
+            <a:r>
+              <a:rPr lang="en-US" sz="1400" dirty="0"/>
+              <a:t>straight from </a:t>
+            </a:r>
+            <a:r>
+              <a:rPr lang="en-US" sz="1400" dirty="0" smtClean="0"/>
+              <a:t>counts_subbed_20150526.txt, which uses 5 micron w (and it does corrections on the number of counts), with the additional 0.8 correction.  However, 2015-08-07 uses the 0.8 along with a correction of (2.34/2.5)</a:t>
+            </a:r>
+            <a:r>
+              <a:rPr lang="en-US" sz="1400" baseline="30000" dirty="0" smtClean="0"/>
+              <a:t>2</a:t>
+            </a:r>
+            <a:r>
+              <a:rPr lang="en-US" sz="1400" dirty="0" smtClean="0"/>
+              <a:t>, due to the file counts_subbed_20150807.txt having used 2.5 micron w.</a:t>
+            </a:r>
+          </a:p>
+          <a:p>
+            <a:r>
+              <a:rPr lang="en-US" sz="1400" dirty="0" smtClean="0"/>
+              <a:t>The above plots are the result.</a:t>
+            </a:r>
+            <a:endParaRPr lang="en-US" sz="1400" dirty="0"/>
+          </a:p>
+        </p:txBody>
+      </p:sp>
+      <p:pic>
+        <p:nvPicPr>
+          <p:cNvPr id="9" name="Picture 8"/>
+          <p:cNvPicPr>
+            <a:picLocks noChangeAspect="1"/>
+          </p:cNvPicPr>
+          <p:nvPr/>
+        </p:nvPicPr>
+        <p:blipFill>
+          <a:blip r:embed="rId4" cstate="print">
+            <a:extLst>
+              <a:ext uri="{28A0092B-C50C-407E-A947-70E740481C1C}">
+                <a14:useLocalDpi xmlns:a14="http://schemas.microsoft.com/office/drawing/2010/main" val="0"/>
+              </a:ext>
+            </a:extLst>
+          </a:blip>
+          <a:stretch>
+            <a:fillRect/>
+          </a:stretch>
+        </p:blipFill>
+        <p:spPr>
+          <a:xfrm>
+            <a:off x="5473784" y="3886200"/>
+            <a:ext cx="1746328" cy="1928899"/>
+          </a:xfrm>
+          <a:prstGeom prst="rect">
+            <a:avLst/>
+          </a:prstGeom>
+        </p:spPr>
+      </p:pic>
+      <p:sp>
+        <p:nvSpPr>
+          <p:cNvPr id="8" name="TextBox 7"/>
+          <p:cNvSpPr txBox="1"/>
+          <p:nvPr/>
+        </p:nvSpPr>
+        <p:spPr>
+          <a:xfrm>
+            <a:off x="6157032" y="3896542"/>
+            <a:ext cx="2514600" cy="954107"/>
+          </a:xfrm>
+          <a:prstGeom prst="rect">
+            <a:avLst/>
+          </a:prstGeom>
+          <a:noFill/>
+        </p:spPr>
+        <p:txBody>
+          <a:bodyPr wrap="square" rtlCol="0">
+            <a:spAutoFit/>
+          </a:bodyPr>
+          <a:lstStyle/>
+          <a:p>
+            <a:r>
+              <a:rPr lang="en-US" sz="1400" dirty="0" smtClean="0"/>
+              <a:t>I just multiplied the numbers in counts_subbed_20150807.txt by 0.8 to get the number for, e.g., the train plot.</a:t>
+            </a:r>
+            <a:endParaRPr lang="en-US" sz="1400" dirty="0"/>
+          </a:p>
+        </p:txBody>
+      </p:sp>
+      <p:sp>
+        <p:nvSpPr>
+          <p:cNvPr id="10" name="TextBox 9"/>
+          <p:cNvSpPr txBox="1"/>
+          <p:nvPr/>
+        </p:nvSpPr>
+        <p:spPr>
+          <a:xfrm>
+            <a:off x="5395024" y="5932003"/>
+            <a:ext cx="2057400" cy="523220"/>
+          </a:xfrm>
+          <a:prstGeom prst="rect">
+            <a:avLst/>
+          </a:prstGeom>
+          <a:noFill/>
+        </p:spPr>
+        <p:txBody>
+          <a:bodyPr wrap="square" rtlCol="0">
+            <a:spAutoFit/>
+          </a:bodyPr>
+          <a:lstStyle/>
+          <a:p>
+            <a:r>
+              <a:rPr lang="en-US" sz="1400" dirty="0" smtClean="0"/>
+              <a:t>I just multiplied 2700 by 0.8 to get 2200 for:</a:t>
+            </a:r>
+            <a:endParaRPr lang="en-US" sz="1400" dirty="0"/>
+          </a:p>
+        </p:txBody>
+      </p:sp>
+      <p:pic>
+        <p:nvPicPr>
+          <p:cNvPr id="11" name="Picture 10"/>
+          <p:cNvPicPr>
+            <a:picLocks noChangeAspect="1"/>
+          </p:cNvPicPr>
+          <p:nvPr/>
+        </p:nvPicPr>
+        <p:blipFill>
+          <a:blip r:embed="rId5" cstate="print">
+            <a:extLst>
+              <a:ext uri="{28A0092B-C50C-407E-A947-70E740481C1C}">
+                <a14:useLocalDpi xmlns:a14="http://schemas.microsoft.com/office/drawing/2010/main" val="0"/>
+              </a:ext>
+            </a:extLst>
+          </a:blip>
+          <a:stretch>
+            <a:fillRect/>
+          </a:stretch>
+        </p:blipFill>
+        <p:spPr>
+          <a:xfrm>
+            <a:off x="7345864" y="5715000"/>
+            <a:ext cx="782331" cy="990600"/>
+          </a:xfrm>
+          <a:prstGeom prst="rect">
+            <a:avLst/>
+          </a:prstGeom>
+        </p:spPr>
+      </p:pic>
+    </p:spTree>
+    <p:extLst>
+      <p:ext uri="{BB962C8B-B14F-4D97-AF65-F5344CB8AC3E}">
+        <p14:creationId xmlns:p14="http://schemas.microsoft.com/office/powerpoint/2010/main" val="1863449578"/>
+      </p:ext>
+    </p:extLst>
+  </p:cSld>
+  <p:clrMapOvr>
+    <a:masterClrMapping/>
+  </p:clrMapOvr>
 </p:sld>
 </file>
 

</xml_diff>

<commit_message>
added 0.8 ions factor image to thought_process.pptx
</commit_message>
<xml_diff>
--- a/thought_process.pptx
+++ b/thought_process.pptx
@@ -29,6 +29,7 @@
     <p:sldId id="276" r:id="rId23"/>
     <p:sldId id="278" r:id="rId24"/>
     <p:sldId id="279" r:id="rId25"/>
+    <p:sldId id="280" r:id="rId26"/>
   </p:sldIdLst>
   <p:sldSz cx="9144000" cy="6858000" type="screen4x3"/>
   <p:notesSz cx="6858000" cy="9144000"/>
@@ -311,7 +312,7 @@
           <a:p>
             <a:fld id="{FE1D6D34-E53B-4A44-8CD7-23C2A4E6AD02}" type="datetimeFigureOut">
               <a:rPr lang="en-US" smtClean="0"/>
-              <a:t>12/31/2015</a:t>
+              <a:t>1/8/2016</a:t>
             </a:fld>
             <a:endParaRPr lang="en-US"/>
           </a:p>
@@ -481,7 +482,7 @@
           <a:p>
             <a:fld id="{FE1D6D34-E53B-4A44-8CD7-23C2A4E6AD02}" type="datetimeFigureOut">
               <a:rPr lang="en-US" smtClean="0"/>
-              <a:t>12/31/2015</a:t>
+              <a:t>1/8/2016</a:t>
             </a:fld>
             <a:endParaRPr lang="en-US"/>
           </a:p>
@@ -661,7 +662,7 @@
           <a:p>
             <a:fld id="{FE1D6D34-E53B-4A44-8CD7-23C2A4E6AD02}" type="datetimeFigureOut">
               <a:rPr lang="en-US" smtClean="0"/>
-              <a:t>12/31/2015</a:t>
+              <a:t>1/8/2016</a:t>
             </a:fld>
             <a:endParaRPr lang="en-US"/>
           </a:p>
@@ -831,7 +832,7 @@
           <a:p>
             <a:fld id="{FE1D6D34-E53B-4A44-8CD7-23C2A4E6AD02}" type="datetimeFigureOut">
               <a:rPr lang="en-US" smtClean="0"/>
-              <a:t>12/31/2015</a:t>
+              <a:t>1/8/2016</a:t>
             </a:fld>
             <a:endParaRPr lang="en-US"/>
           </a:p>
@@ -1077,7 +1078,7 @@
           <a:p>
             <a:fld id="{FE1D6D34-E53B-4A44-8CD7-23C2A4E6AD02}" type="datetimeFigureOut">
               <a:rPr lang="en-US" smtClean="0"/>
-              <a:t>12/31/2015</a:t>
+              <a:t>1/8/2016</a:t>
             </a:fld>
             <a:endParaRPr lang="en-US"/>
           </a:p>
@@ -1365,7 +1366,7 @@
           <a:p>
             <a:fld id="{FE1D6D34-E53B-4A44-8CD7-23C2A4E6AD02}" type="datetimeFigureOut">
               <a:rPr lang="en-US" smtClean="0"/>
-              <a:t>12/31/2015</a:t>
+              <a:t>1/8/2016</a:t>
             </a:fld>
             <a:endParaRPr lang="en-US"/>
           </a:p>
@@ -1787,7 +1788,7 @@
           <a:p>
             <a:fld id="{FE1D6D34-E53B-4A44-8CD7-23C2A4E6AD02}" type="datetimeFigureOut">
               <a:rPr lang="en-US" smtClean="0"/>
-              <a:t>12/31/2015</a:t>
+              <a:t>1/8/2016</a:t>
             </a:fld>
             <a:endParaRPr lang="en-US"/>
           </a:p>
@@ -1905,7 +1906,7 @@
           <a:p>
             <a:fld id="{FE1D6D34-E53B-4A44-8CD7-23C2A4E6AD02}" type="datetimeFigureOut">
               <a:rPr lang="en-US" smtClean="0"/>
-              <a:t>12/31/2015</a:t>
+              <a:t>1/8/2016</a:t>
             </a:fld>
             <a:endParaRPr lang="en-US"/>
           </a:p>
@@ -2000,7 +2001,7 @@
           <a:p>
             <a:fld id="{FE1D6D34-E53B-4A44-8CD7-23C2A4E6AD02}" type="datetimeFigureOut">
               <a:rPr lang="en-US" smtClean="0"/>
-              <a:t>12/31/2015</a:t>
+              <a:t>1/8/2016</a:t>
             </a:fld>
             <a:endParaRPr lang="en-US"/>
           </a:p>
@@ -2277,7 +2278,7 @@
           <a:p>
             <a:fld id="{FE1D6D34-E53B-4A44-8CD7-23C2A4E6AD02}" type="datetimeFigureOut">
               <a:rPr lang="en-US" smtClean="0"/>
-              <a:t>12/31/2015</a:t>
+              <a:t>1/8/2016</a:t>
             </a:fld>
             <a:endParaRPr lang="en-US"/>
           </a:p>
@@ -2530,7 +2531,7 @@
           <a:p>
             <a:fld id="{FE1D6D34-E53B-4A44-8CD7-23C2A4E6AD02}" type="datetimeFigureOut">
               <a:rPr lang="en-US" smtClean="0"/>
-              <a:t>12/31/2015</a:t>
+              <a:t>1/8/2016</a:t>
             </a:fld>
             <a:endParaRPr lang="en-US"/>
           </a:p>
@@ -2743,7 +2744,7 @@
           <a:p>
             <a:fld id="{FE1D6D34-E53B-4A44-8CD7-23C2A4E6AD02}" type="datetimeFigureOut">
               <a:rPr lang="en-US" smtClean="0"/>
-              <a:t>12/31/2015</a:t>
+              <a:t>1/8/2016</a:t>
             </a:fld>
             <a:endParaRPr lang="en-US"/>
           </a:p>
@@ -7580,7 +7581,7 @@
         </p:blipFill>
         <p:spPr>
           <a:xfrm>
-            <a:off x="5473784" y="3886200"/>
+            <a:off x="5031760" y="3886200"/>
             <a:ext cx="1746328" cy="1928899"/>
           </a:xfrm>
           <a:prstGeom prst="rect">
@@ -7596,7 +7597,7 @@
         </p:nvSpPr>
         <p:spPr>
           <a:xfrm>
-            <a:off x="6157032" y="3896542"/>
+            <a:off x="5715008" y="3896542"/>
             <a:ext cx="2514600" cy="954107"/>
           </a:xfrm>
           <a:prstGeom prst="rect">
@@ -7626,7 +7627,7 @@
         </p:nvSpPr>
         <p:spPr>
           <a:xfrm>
-            <a:off x="5395024" y="5932003"/>
+            <a:off x="4953000" y="5932003"/>
             <a:ext cx="2057400" cy="523220"/>
           </a:xfrm>
           <a:prstGeom prst="rect">
@@ -7670,7 +7671,7 @@
         </p:blipFill>
         <p:spPr>
           <a:xfrm>
-            <a:off x="7345864" y="5715000"/>
+            <a:off x="6903840" y="5715000"/>
             <a:ext cx="782331" cy="990600"/>
           </a:xfrm>
           <a:prstGeom prst="rect">
@@ -7678,10 +7679,251 @@
           </a:prstGeom>
         </p:spPr>
       </p:pic>
+      <p:pic>
+        <p:nvPicPr>
+          <p:cNvPr id="12" name="Picture 11"/>
+          <p:cNvPicPr>
+            <a:picLocks noChangeAspect="1"/>
+          </p:cNvPicPr>
+          <p:nvPr/>
+        </p:nvPicPr>
+        <p:blipFill>
+          <a:blip r:embed="rId6" cstate="print">
+            <a:extLst>
+              <a:ext uri="{28A0092B-C50C-407E-A947-70E740481C1C}">
+                <a14:useLocalDpi xmlns:a14="http://schemas.microsoft.com/office/drawing/2010/main" val="0"/>
+              </a:ext>
+            </a:extLst>
+          </a:blip>
+          <a:stretch>
+            <a:fillRect/>
+          </a:stretch>
+        </p:blipFill>
+        <p:spPr>
+          <a:xfrm>
+            <a:off x="7886700" y="4745057"/>
+            <a:ext cx="1257300" cy="1676400"/>
+          </a:xfrm>
+          <a:prstGeom prst="rect">
+            <a:avLst/>
+          </a:prstGeom>
+        </p:spPr>
+      </p:pic>
+      <p:sp>
+        <p:nvSpPr>
+          <p:cNvPr id="13" name="TextBox 12"/>
+          <p:cNvSpPr txBox="1"/>
+          <p:nvPr/>
+        </p:nvSpPr>
+        <p:spPr>
+          <a:xfrm>
+            <a:off x="6736492" y="4745057"/>
+            <a:ext cx="1181100" cy="738664"/>
+          </a:xfrm>
+          <a:prstGeom prst="rect">
+            <a:avLst/>
+          </a:prstGeom>
+          <a:noFill/>
+        </p:spPr>
+        <p:txBody>
+          <a:bodyPr wrap="square" rtlCol="0">
+            <a:spAutoFit/>
+          </a:bodyPr>
+          <a:lstStyle/>
+          <a:p>
+            <a:r>
+              <a:rPr lang="en-US" sz="1050" b="1" i="1" dirty="0" smtClean="0">
+                <a:solidFill>
+                  <a:schemeClr val="accent6">
+                    <a:lumMod val="50000"/>
+                  </a:schemeClr>
+                </a:solidFill>
+              </a:rPr>
+              <a:t>In case this helps in the event you need to re-trace how you got 0.8</a:t>
+            </a:r>
+            <a:endParaRPr lang="en-US" sz="1050" b="1" i="1" dirty="0">
+              <a:solidFill>
+                <a:schemeClr val="accent6">
+                  <a:lumMod val="50000"/>
+                </a:schemeClr>
+              </a:solidFill>
+            </a:endParaRPr>
+          </a:p>
+        </p:txBody>
+      </p:sp>
+      <p:sp>
+        <p:nvSpPr>
+          <p:cNvPr id="14" name="Right Arrow 13"/>
+          <p:cNvSpPr/>
+          <p:nvPr/>
+        </p:nvSpPr>
+        <p:spPr>
+          <a:xfrm>
+            <a:off x="7734300" y="5101003"/>
+            <a:ext cx="114300" cy="228600"/>
+          </a:xfrm>
+          <a:prstGeom prst="rightArrow">
+            <a:avLst/>
+          </a:prstGeom>
+        </p:spPr>
+        <p:style>
+          <a:lnRef idx="2">
+            <a:schemeClr val="accent1">
+              <a:shade val="50000"/>
+            </a:schemeClr>
+          </a:lnRef>
+          <a:fillRef idx="1">
+            <a:schemeClr val="accent1"/>
+          </a:fillRef>
+          <a:effectRef idx="0">
+            <a:schemeClr val="accent1"/>
+          </a:effectRef>
+          <a:fontRef idx="minor">
+            <a:schemeClr val="lt1"/>
+          </a:fontRef>
+        </p:style>
+        <p:txBody>
+          <a:bodyPr rtlCol="0" anchor="ctr"/>
+          <a:lstStyle/>
+          <a:p>
+            <a:pPr algn="ctr"/>
+            <a:endParaRPr lang="en-US"/>
+          </a:p>
+        </p:txBody>
+      </p:sp>
+      <p:sp>
+        <p:nvSpPr>
+          <p:cNvPr id="17" name="TextBox 16"/>
+          <p:cNvSpPr txBox="1"/>
+          <p:nvPr/>
+        </p:nvSpPr>
+        <p:spPr>
+          <a:xfrm>
+            <a:off x="7962900" y="6400800"/>
+            <a:ext cx="1181100" cy="415498"/>
+          </a:xfrm>
+          <a:prstGeom prst="rect">
+            <a:avLst/>
+          </a:prstGeom>
+          <a:noFill/>
+        </p:spPr>
+        <p:txBody>
+          <a:bodyPr wrap="square" rtlCol="0">
+            <a:spAutoFit/>
+          </a:bodyPr>
+          <a:lstStyle/>
+          <a:p>
+            <a:pPr algn="ctr"/>
+            <a:r>
+              <a:rPr lang="en-US" sz="1050" b="1" i="1" dirty="0" smtClean="0">
+                <a:solidFill>
+                  <a:srgbClr val="FF0000"/>
+                </a:solidFill>
+              </a:rPr>
+              <a:t>See next slide for higher-res</a:t>
+            </a:r>
+            <a:endParaRPr lang="en-US" sz="1050" b="1" i="1" dirty="0">
+              <a:solidFill>
+                <a:srgbClr val="FF0000"/>
+              </a:solidFill>
+            </a:endParaRPr>
+          </a:p>
+        </p:txBody>
+      </p:sp>
     </p:spTree>
     <p:extLst>
       <p:ext uri="{BB962C8B-B14F-4D97-AF65-F5344CB8AC3E}">
         <p14:creationId xmlns:p14="http://schemas.microsoft.com/office/powerpoint/2010/main" val="1863449578"/>
+      </p:ext>
+    </p:extLst>
+  </p:cSld>
+  <p:clrMapOvr>
+    <a:masterClrMapping/>
+  </p:clrMapOvr>
+</p:sld>
+</file>
+
+<file path=ppt/slides/slide25.xml><?xml version="1.0" encoding="utf-8"?>
+<p:sld xmlns:a="http://schemas.openxmlformats.org/drawingml/2006/main" xmlns:r="http://schemas.openxmlformats.org/officeDocument/2006/relationships" xmlns:p="http://schemas.openxmlformats.org/presentationml/2006/main">
+  <p:cSld>
+    <p:spTree>
+      <p:nvGrpSpPr>
+        <p:cNvPr id="1" name=""/>
+        <p:cNvGrpSpPr/>
+        <p:nvPr/>
+      </p:nvGrpSpPr>
+      <p:grpSpPr>
+        <a:xfrm>
+          <a:off x="0" y="0"/>
+          <a:ext cx="0" cy="0"/>
+          <a:chOff x="0" y="0"/>
+          <a:chExt cx="0" cy="0"/>
+        </a:xfrm>
+      </p:grpSpPr>
+      <p:pic>
+        <p:nvPicPr>
+          <p:cNvPr id="2" name="Picture 1"/>
+          <p:cNvPicPr>
+            <a:picLocks noChangeAspect="1"/>
+          </p:cNvPicPr>
+          <p:nvPr/>
+        </p:nvPicPr>
+        <p:blipFill>
+          <a:blip r:embed="rId2" cstate="print">
+            <a:extLst>
+              <a:ext uri="{28A0092B-C50C-407E-A947-70E740481C1C}">
+                <a14:useLocalDpi xmlns:a14="http://schemas.microsoft.com/office/drawing/2010/main" val="0"/>
+              </a:ext>
+            </a:extLst>
+          </a:blip>
+          <a:stretch>
+            <a:fillRect/>
+          </a:stretch>
+        </p:blipFill>
+        <p:spPr>
+          <a:xfrm>
+            <a:off x="2000250" y="0"/>
+            <a:ext cx="5143500" cy="6858000"/>
+          </a:xfrm>
+          <a:prstGeom prst="rect">
+            <a:avLst/>
+          </a:prstGeom>
+        </p:spPr>
+      </p:pic>
+      <p:sp>
+        <p:nvSpPr>
+          <p:cNvPr id="3" name="TextBox 2"/>
+          <p:cNvSpPr txBox="1"/>
+          <p:nvPr/>
+        </p:nvSpPr>
+        <p:spPr>
+          <a:xfrm>
+            <a:off x="7315200" y="3414584"/>
+            <a:ext cx="1690143" cy="307777"/>
+          </a:xfrm>
+          <a:prstGeom prst="rect">
+            <a:avLst/>
+          </a:prstGeom>
+          <a:noFill/>
+        </p:spPr>
+        <p:txBody>
+          <a:bodyPr wrap="none" rtlCol="0">
+            <a:spAutoFit/>
+          </a:bodyPr>
+          <a:lstStyle/>
+          <a:p>
+            <a:r>
+              <a:rPr lang="en-US" sz="1400" dirty="0" smtClean="0"/>
+              <a:t>(from previous slide)</a:t>
+            </a:r>
+            <a:endParaRPr lang="en-US" sz="1400" dirty="0"/>
+          </a:p>
+        </p:txBody>
+      </p:sp>
+    </p:spTree>
+    <p:extLst>
+      <p:ext uri="{BB962C8B-B14F-4D97-AF65-F5344CB8AC3E}">
+        <p14:creationId xmlns:p14="http://schemas.microsoft.com/office/powerpoint/2010/main" val="1535868476"/>
       </p:ext>
     </p:extLst>
   </p:cSld>

</xml_diff>